<commit_message>
added course sectors diagram
</commit_message>
<xml_diff>
--- a/models/モデルシートver0.pptx
+++ b/models/モデルシートver0.pptx
@@ -4195,7 +4195,7 @@
         </p:blipFill>
         <p:spPr bwMode="auto">
           <a:xfrm>
-            <a:off x="1304408" y="6425795"/>
+            <a:off x="2072935" y="6301372"/>
             <a:ext cx="3422288" cy="2271186"/>
           </a:xfrm>
           <a:prstGeom prst="rect">
@@ -7139,15 +7139,7 @@
                       </a:r>
                       <a:r>
                         <a:rPr kumimoji="1" lang="ja-JP" altLang="en-US" sz="900" dirty="0" smtClean="0"/>
-                        <a:t>で実行する必要があるバランサーとそれに関連</a:t>
-                      </a:r>
-                      <a:r>
-                        <a:rPr kumimoji="1" lang="ja-JP" altLang="en-US" sz="900" dirty="0" smtClean="0"/>
-                        <a:t>する駆動処理</a:t>
-                      </a:r>
-                      <a:r>
-                        <a:rPr kumimoji="1" lang="ja-JP" altLang="en-US" sz="900" dirty="0" smtClean="0"/>
-                        <a:t>をまとめた。</a:t>
+                        <a:t>で実行する必要があるバランサーとそれに関連する駆動処理をまとめた。</a:t>
                       </a:r>
                       <a:endParaRPr kumimoji="1" lang="en-US" altLang="ja-JP" sz="900" dirty="0" smtClean="0"/>
                     </a:p>
@@ -7594,15 +7586,7 @@
                 <a:ea typeface="メイリオ" pitchFamily="50" charset="-128"/>
                 <a:cs typeface="メイリオ" pitchFamily="50" charset="-128"/>
               </a:rPr>
-              <a:t>③　</a:t>
-            </a:r>
-            <a:r>
-              <a:rPr lang="ja-JP" altLang="en-US" sz="1100" dirty="0" smtClean="0">
-                <a:latin typeface="メイリオ" pitchFamily="50" charset="-128"/>
-                <a:ea typeface="メイリオ" pitchFamily="50" charset="-128"/>
-                <a:cs typeface="メイリオ" pitchFamily="50" charset="-128"/>
-              </a:rPr>
-              <a:t>区間切り替わりの検知に必要十分な周期を割り当てる</a:t>
+              <a:t>③　区間切り替わりの検知に必要十分な周期を割り当てる</a:t>
             </a:r>
             <a:endParaRPr kumimoji="1" lang="ja-JP" altLang="en-US" sz="1100" dirty="0">
               <a:latin typeface="メイリオ" pitchFamily="50" charset="-128"/>
@@ -8038,6 +8022,3441 @@
           <a:chExt cx="0" cy="0"/>
         </a:xfrm>
       </p:grpSpPr>
+      <p:pic>
+        <p:nvPicPr>
+          <p:cNvPr id="2" name="Picture 2"/>
+          <p:cNvPicPr>
+            <a:picLocks noChangeAspect="1" noChangeArrowheads="1"/>
+          </p:cNvPicPr>
+          <p:nvPr/>
+        </p:nvPicPr>
+        <p:blipFill rotWithShape="1">
+          <a:blip r:embed="rId2" cstate="print">
+            <a:extLst>
+              <a:ext uri="{28A0092B-C50C-407E-A947-70E740481C1C}">
+                <a14:useLocalDpi xmlns:a14="http://schemas.microsoft.com/office/drawing/2010/main" val="0"/>
+              </a:ext>
+            </a:extLst>
+          </a:blip>
+          <a:srcRect r="1089"/>
+          <a:stretch/>
+        </p:blipFill>
+        <p:spPr bwMode="auto">
+          <a:xfrm>
+            <a:off x="688058" y="208623"/>
+            <a:ext cx="6712024" cy="4503434"/>
+          </a:xfrm>
+          <a:prstGeom prst="rect">
+            <a:avLst/>
+          </a:prstGeom>
+          <a:noFill/>
+          <a:ln>
+            <a:noFill/>
+          </a:ln>
+          <a:effectLst/>
+          <a:extLst>
+            <a:ext uri="{909E8E84-426E-40DD-AFC4-6F175D3DCCD1}">
+              <a14:hiddenFill xmlns:a14="http://schemas.microsoft.com/office/drawing/2010/main">
+                <a:solidFill>
+                  <a:schemeClr val="accent1"/>
+                </a:solidFill>
+              </a14:hiddenFill>
+            </a:ext>
+            <a:ext uri="{91240B29-F687-4F45-9708-019B960494DF}">
+              <a14:hiddenLine xmlns:a14="http://schemas.microsoft.com/office/drawing/2010/main" w="9525">
+                <a:solidFill>
+                  <a:schemeClr val="tx1"/>
+                </a:solidFill>
+                <a:miter lim="800000"/>
+                <a:headEnd/>
+                <a:tailEnd/>
+              </a14:hiddenLine>
+            </a:ext>
+            <a:ext uri="{AF507438-7753-43E0-B8FC-AC1667EBCBE1}">
+              <a14:hiddenEffects xmlns:a14="http://schemas.microsoft.com/office/drawing/2010/main">
+                <a:effectLst>
+                  <a:outerShdw dist="35921" dir="2700000" algn="ctr" rotWithShape="0">
+                    <a:schemeClr val="bg2"/>
+                  </a:outerShdw>
+                </a:effectLst>
+              </a14:hiddenEffects>
+            </a:ext>
+          </a:extLst>
+        </p:spPr>
+      </p:pic>
+      <p:sp>
+        <p:nvSpPr>
+          <p:cNvPr id="3" name="角丸四角形 2"/>
+          <p:cNvSpPr/>
+          <p:nvPr/>
+        </p:nvSpPr>
+        <p:spPr>
+          <a:xfrm>
+            <a:off x="4871780" y="397027"/>
+            <a:ext cx="2520280" cy="576064"/>
+          </a:xfrm>
+          <a:prstGeom prst="roundRect">
+            <a:avLst/>
+          </a:prstGeom>
+          <a:solidFill>
+            <a:schemeClr val="accent1">
+              <a:alpha val="30000"/>
+            </a:schemeClr>
+          </a:solidFill>
+        </p:spPr>
+        <p:style>
+          <a:lnRef idx="2">
+            <a:schemeClr val="accent1">
+              <a:shade val="50000"/>
+            </a:schemeClr>
+          </a:lnRef>
+          <a:fillRef idx="1">
+            <a:schemeClr val="accent1"/>
+          </a:fillRef>
+          <a:effectRef idx="0">
+            <a:schemeClr val="accent1"/>
+          </a:effectRef>
+          <a:fontRef idx="minor">
+            <a:schemeClr val="lt1"/>
+          </a:fontRef>
+        </p:style>
+        <p:txBody>
+          <a:bodyPr rtlCol="0" anchor="ctr"/>
+          <a:lstStyle/>
+          <a:p>
+            <a:pPr algn="ctr"/>
+            <a:endParaRPr kumimoji="1" lang="ja-JP" altLang="en-US"/>
+          </a:p>
+        </p:txBody>
+      </p:sp>
+      <p:sp>
+        <p:nvSpPr>
+          <p:cNvPr id="4" name="角丸四角形 3"/>
+          <p:cNvSpPr/>
+          <p:nvPr/>
+        </p:nvSpPr>
+        <p:spPr>
+          <a:xfrm>
+            <a:off x="4191916" y="397027"/>
+            <a:ext cx="679864" cy="576064"/>
+          </a:xfrm>
+          <a:prstGeom prst="roundRect">
+            <a:avLst/>
+          </a:prstGeom>
+          <a:solidFill>
+            <a:schemeClr val="accent2">
+              <a:lumMod val="75000"/>
+              <a:alpha val="30000"/>
+            </a:schemeClr>
+          </a:solidFill>
+          <a:ln>
+            <a:solidFill>
+              <a:schemeClr val="accent2">
+                <a:lumMod val="75000"/>
+              </a:schemeClr>
+            </a:solidFill>
+          </a:ln>
+        </p:spPr>
+        <p:style>
+          <a:lnRef idx="2">
+            <a:schemeClr val="accent1">
+              <a:shade val="50000"/>
+            </a:schemeClr>
+          </a:lnRef>
+          <a:fillRef idx="1">
+            <a:schemeClr val="accent1"/>
+          </a:fillRef>
+          <a:effectRef idx="0">
+            <a:schemeClr val="accent1"/>
+          </a:effectRef>
+          <a:fontRef idx="minor">
+            <a:schemeClr val="lt1"/>
+          </a:fontRef>
+        </p:style>
+        <p:txBody>
+          <a:bodyPr rtlCol="0" anchor="ctr"/>
+          <a:lstStyle/>
+          <a:p>
+            <a:pPr algn="ctr"/>
+            <a:endParaRPr kumimoji="1" lang="ja-JP" altLang="en-US"/>
+          </a:p>
+        </p:txBody>
+      </p:sp>
+      <p:sp>
+        <p:nvSpPr>
+          <p:cNvPr id="5" name="角丸四角形 4"/>
+          <p:cNvSpPr/>
+          <p:nvPr/>
+        </p:nvSpPr>
+        <p:spPr>
+          <a:xfrm>
+            <a:off x="2063468" y="397027"/>
+            <a:ext cx="2128448" cy="576064"/>
+          </a:xfrm>
+          <a:prstGeom prst="roundRect">
+            <a:avLst/>
+          </a:prstGeom>
+          <a:solidFill>
+            <a:schemeClr val="accent3">
+              <a:lumMod val="50000"/>
+              <a:alpha val="30000"/>
+            </a:schemeClr>
+          </a:solidFill>
+          <a:ln>
+            <a:solidFill>
+              <a:schemeClr val="accent3">
+                <a:lumMod val="75000"/>
+              </a:schemeClr>
+            </a:solidFill>
+          </a:ln>
+        </p:spPr>
+        <p:style>
+          <a:lnRef idx="2">
+            <a:schemeClr val="accent1">
+              <a:shade val="50000"/>
+            </a:schemeClr>
+          </a:lnRef>
+          <a:fillRef idx="1">
+            <a:schemeClr val="accent1"/>
+          </a:fillRef>
+          <a:effectRef idx="0">
+            <a:schemeClr val="accent1"/>
+          </a:effectRef>
+          <a:fontRef idx="minor">
+            <a:schemeClr val="lt1"/>
+          </a:fontRef>
+        </p:style>
+        <p:txBody>
+          <a:bodyPr rtlCol="0" anchor="ctr"/>
+          <a:lstStyle/>
+          <a:p>
+            <a:pPr algn="ctr"/>
+            <a:endParaRPr kumimoji="1" lang="ja-JP" altLang="en-US"/>
+          </a:p>
+        </p:txBody>
+      </p:sp>
+      <p:sp>
+        <p:nvSpPr>
+          <p:cNvPr id="6" name="角丸四角形 5"/>
+          <p:cNvSpPr/>
+          <p:nvPr/>
+        </p:nvSpPr>
+        <p:spPr>
+          <a:xfrm rot="18826557">
+            <a:off x="582684" y="680744"/>
+            <a:ext cx="1889398" cy="1126092"/>
+          </a:xfrm>
+          <a:custGeom>
+            <a:avLst/>
+            <a:gdLst>
+              <a:gd name="connsiteX0" fmla="*/ 0 w 1402298"/>
+              <a:gd name="connsiteY0" fmla="*/ 96013 h 576064"/>
+              <a:gd name="connsiteX1" fmla="*/ 96013 w 1402298"/>
+              <a:gd name="connsiteY1" fmla="*/ 0 h 576064"/>
+              <a:gd name="connsiteX2" fmla="*/ 1306285 w 1402298"/>
+              <a:gd name="connsiteY2" fmla="*/ 0 h 576064"/>
+              <a:gd name="connsiteX3" fmla="*/ 1402298 w 1402298"/>
+              <a:gd name="connsiteY3" fmla="*/ 96013 h 576064"/>
+              <a:gd name="connsiteX4" fmla="*/ 1402298 w 1402298"/>
+              <a:gd name="connsiteY4" fmla="*/ 480051 h 576064"/>
+              <a:gd name="connsiteX5" fmla="*/ 1306285 w 1402298"/>
+              <a:gd name="connsiteY5" fmla="*/ 576064 h 576064"/>
+              <a:gd name="connsiteX6" fmla="*/ 96013 w 1402298"/>
+              <a:gd name="connsiteY6" fmla="*/ 576064 h 576064"/>
+              <a:gd name="connsiteX7" fmla="*/ 0 w 1402298"/>
+              <a:gd name="connsiteY7" fmla="*/ 480051 h 576064"/>
+              <a:gd name="connsiteX8" fmla="*/ 0 w 1402298"/>
+              <a:gd name="connsiteY8" fmla="*/ 96013 h 576064"/>
+              <a:gd name="connsiteX0" fmla="*/ 0 w 1402298"/>
+              <a:gd name="connsiteY0" fmla="*/ 182434 h 662485"/>
+              <a:gd name="connsiteX1" fmla="*/ 96013 w 1402298"/>
+              <a:gd name="connsiteY1" fmla="*/ 86421 h 662485"/>
+              <a:gd name="connsiteX2" fmla="*/ 1297353 w 1402298"/>
+              <a:gd name="connsiteY2" fmla="*/ 0 h 662485"/>
+              <a:gd name="connsiteX3" fmla="*/ 1402298 w 1402298"/>
+              <a:gd name="connsiteY3" fmla="*/ 182434 h 662485"/>
+              <a:gd name="connsiteX4" fmla="*/ 1402298 w 1402298"/>
+              <a:gd name="connsiteY4" fmla="*/ 566472 h 662485"/>
+              <a:gd name="connsiteX5" fmla="*/ 1306285 w 1402298"/>
+              <a:gd name="connsiteY5" fmla="*/ 662485 h 662485"/>
+              <a:gd name="connsiteX6" fmla="*/ 96013 w 1402298"/>
+              <a:gd name="connsiteY6" fmla="*/ 662485 h 662485"/>
+              <a:gd name="connsiteX7" fmla="*/ 0 w 1402298"/>
+              <a:gd name="connsiteY7" fmla="*/ 566472 h 662485"/>
+              <a:gd name="connsiteX8" fmla="*/ 0 w 1402298"/>
+              <a:gd name="connsiteY8" fmla="*/ 182434 h 662485"/>
+              <a:gd name="connsiteX0" fmla="*/ 0 w 1402298"/>
+              <a:gd name="connsiteY0" fmla="*/ 188627 h 668678"/>
+              <a:gd name="connsiteX1" fmla="*/ 96013 w 1402298"/>
+              <a:gd name="connsiteY1" fmla="*/ 92614 h 668678"/>
+              <a:gd name="connsiteX2" fmla="*/ 1259760 w 1402298"/>
+              <a:gd name="connsiteY2" fmla="*/ 0 h 668678"/>
+              <a:gd name="connsiteX3" fmla="*/ 1402298 w 1402298"/>
+              <a:gd name="connsiteY3" fmla="*/ 188627 h 668678"/>
+              <a:gd name="connsiteX4" fmla="*/ 1402298 w 1402298"/>
+              <a:gd name="connsiteY4" fmla="*/ 572665 h 668678"/>
+              <a:gd name="connsiteX5" fmla="*/ 1306285 w 1402298"/>
+              <a:gd name="connsiteY5" fmla="*/ 668678 h 668678"/>
+              <a:gd name="connsiteX6" fmla="*/ 96013 w 1402298"/>
+              <a:gd name="connsiteY6" fmla="*/ 668678 h 668678"/>
+              <a:gd name="connsiteX7" fmla="*/ 0 w 1402298"/>
+              <a:gd name="connsiteY7" fmla="*/ 572665 h 668678"/>
+              <a:gd name="connsiteX8" fmla="*/ 0 w 1402298"/>
+              <a:gd name="connsiteY8" fmla="*/ 188627 h 668678"/>
+              <a:gd name="connsiteX0" fmla="*/ 0 w 1732461"/>
+              <a:gd name="connsiteY0" fmla="*/ 96013 h 576064"/>
+              <a:gd name="connsiteX1" fmla="*/ 96013 w 1732461"/>
+              <a:gd name="connsiteY1" fmla="*/ 0 h 576064"/>
+              <a:gd name="connsiteX2" fmla="*/ 1727363 w 1732461"/>
+              <a:gd name="connsiteY2" fmla="*/ 219183 h 576064"/>
+              <a:gd name="connsiteX3" fmla="*/ 1402298 w 1732461"/>
+              <a:gd name="connsiteY3" fmla="*/ 96013 h 576064"/>
+              <a:gd name="connsiteX4" fmla="*/ 1402298 w 1732461"/>
+              <a:gd name="connsiteY4" fmla="*/ 480051 h 576064"/>
+              <a:gd name="connsiteX5" fmla="*/ 1306285 w 1732461"/>
+              <a:gd name="connsiteY5" fmla="*/ 576064 h 576064"/>
+              <a:gd name="connsiteX6" fmla="*/ 96013 w 1732461"/>
+              <a:gd name="connsiteY6" fmla="*/ 576064 h 576064"/>
+              <a:gd name="connsiteX7" fmla="*/ 0 w 1732461"/>
+              <a:gd name="connsiteY7" fmla="*/ 480051 h 576064"/>
+              <a:gd name="connsiteX8" fmla="*/ 0 w 1732461"/>
+              <a:gd name="connsiteY8" fmla="*/ 96013 h 576064"/>
+              <a:gd name="connsiteX0" fmla="*/ 0 w 1402298"/>
+              <a:gd name="connsiteY0" fmla="*/ 188626 h 668677"/>
+              <a:gd name="connsiteX1" fmla="*/ 96013 w 1402298"/>
+              <a:gd name="connsiteY1" fmla="*/ 92613 h 668677"/>
+              <a:gd name="connsiteX2" fmla="*/ 1259760 w 1402298"/>
+              <a:gd name="connsiteY2" fmla="*/ 0 h 668677"/>
+              <a:gd name="connsiteX3" fmla="*/ 1402298 w 1402298"/>
+              <a:gd name="connsiteY3" fmla="*/ 188626 h 668677"/>
+              <a:gd name="connsiteX4" fmla="*/ 1402298 w 1402298"/>
+              <a:gd name="connsiteY4" fmla="*/ 572664 h 668677"/>
+              <a:gd name="connsiteX5" fmla="*/ 1306285 w 1402298"/>
+              <a:gd name="connsiteY5" fmla="*/ 668677 h 668677"/>
+              <a:gd name="connsiteX6" fmla="*/ 96013 w 1402298"/>
+              <a:gd name="connsiteY6" fmla="*/ 668677 h 668677"/>
+              <a:gd name="connsiteX7" fmla="*/ 0 w 1402298"/>
+              <a:gd name="connsiteY7" fmla="*/ 572664 h 668677"/>
+              <a:gd name="connsiteX8" fmla="*/ 0 w 1402298"/>
+              <a:gd name="connsiteY8" fmla="*/ 188626 h 668677"/>
+              <a:gd name="connsiteX0" fmla="*/ 0 w 1653527"/>
+              <a:gd name="connsiteY0" fmla="*/ 188626 h 668677"/>
+              <a:gd name="connsiteX1" fmla="*/ 96013 w 1653527"/>
+              <a:gd name="connsiteY1" fmla="*/ 92613 h 668677"/>
+              <a:gd name="connsiteX2" fmla="*/ 1259760 w 1653527"/>
+              <a:gd name="connsiteY2" fmla="*/ 0 h 668677"/>
+              <a:gd name="connsiteX3" fmla="*/ 1653527 w 1653527"/>
+              <a:gd name="connsiteY3" fmla="*/ 285614 h 668677"/>
+              <a:gd name="connsiteX4" fmla="*/ 1402298 w 1653527"/>
+              <a:gd name="connsiteY4" fmla="*/ 572664 h 668677"/>
+              <a:gd name="connsiteX5" fmla="*/ 1306285 w 1653527"/>
+              <a:gd name="connsiteY5" fmla="*/ 668677 h 668677"/>
+              <a:gd name="connsiteX6" fmla="*/ 96013 w 1653527"/>
+              <a:gd name="connsiteY6" fmla="*/ 668677 h 668677"/>
+              <a:gd name="connsiteX7" fmla="*/ 0 w 1653527"/>
+              <a:gd name="connsiteY7" fmla="*/ 572664 h 668677"/>
+              <a:gd name="connsiteX8" fmla="*/ 0 w 1653527"/>
+              <a:gd name="connsiteY8" fmla="*/ 188626 h 668677"/>
+              <a:gd name="connsiteX0" fmla="*/ 0 w 1653527"/>
+              <a:gd name="connsiteY0" fmla="*/ 188626 h 668677"/>
+              <a:gd name="connsiteX1" fmla="*/ 96013 w 1653527"/>
+              <a:gd name="connsiteY1" fmla="*/ 92613 h 668677"/>
+              <a:gd name="connsiteX2" fmla="*/ 1259760 w 1653527"/>
+              <a:gd name="connsiteY2" fmla="*/ 0 h 668677"/>
+              <a:gd name="connsiteX3" fmla="*/ 1653527 w 1653527"/>
+              <a:gd name="connsiteY3" fmla="*/ 285614 h 668677"/>
+              <a:gd name="connsiteX4" fmla="*/ 1365626 w 1653527"/>
+              <a:gd name="connsiteY4" fmla="*/ 523376 h 668677"/>
+              <a:gd name="connsiteX5" fmla="*/ 1306285 w 1653527"/>
+              <a:gd name="connsiteY5" fmla="*/ 668677 h 668677"/>
+              <a:gd name="connsiteX6" fmla="*/ 96013 w 1653527"/>
+              <a:gd name="connsiteY6" fmla="*/ 668677 h 668677"/>
+              <a:gd name="connsiteX7" fmla="*/ 0 w 1653527"/>
+              <a:gd name="connsiteY7" fmla="*/ 572664 h 668677"/>
+              <a:gd name="connsiteX8" fmla="*/ 0 w 1653527"/>
+              <a:gd name="connsiteY8" fmla="*/ 188626 h 668677"/>
+              <a:gd name="connsiteX0" fmla="*/ 0 w 1653527"/>
+              <a:gd name="connsiteY0" fmla="*/ 188626 h 668677"/>
+              <a:gd name="connsiteX1" fmla="*/ 96013 w 1653527"/>
+              <a:gd name="connsiteY1" fmla="*/ 92613 h 668677"/>
+              <a:gd name="connsiteX2" fmla="*/ 1259760 w 1653527"/>
+              <a:gd name="connsiteY2" fmla="*/ 0 h 668677"/>
+              <a:gd name="connsiteX3" fmla="*/ 1653527 w 1653527"/>
+              <a:gd name="connsiteY3" fmla="*/ 285614 h 668677"/>
+              <a:gd name="connsiteX4" fmla="*/ 1365626 w 1653527"/>
+              <a:gd name="connsiteY4" fmla="*/ 523376 h 668677"/>
+              <a:gd name="connsiteX5" fmla="*/ 1248065 w 1653527"/>
+              <a:gd name="connsiteY5" fmla="*/ 618928 h 668677"/>
+              <a:gd name="connsiteX6" fmla="*/ 96013 w 1653527"/>
+              <a:gd name="connsiteY6" fmla="*/ 668677 h 668677"/>
+              <a:gd name="connsiteX7" fmla="*/ 0 w 1653527"/>
+              <a:gd name="connsiteY7" fmla="*/ 572664 h 668677"/>
+              <a:gd name="connsiteX8" fmla="*/ 0 w 1653527"/>
+              <a:gd name="connsiteY8" fmla="*/ 188626 h 668677"/>
+              <a:gd name="connsiteX0" fmla="*/ 0 w 1653527"/>
+              <a:gd name="connsiteY0" fmla="*/ 188626 h 668677"/>
+              <a:gd name="connsiteX1" fmla="*/ 96013 w 1653527"/>
+              <a:gd name="connsiteY1" fmla="*/ 92613 h 668677"/>
+              <a:gd name="connsiteX2" fmla="*/ 1259760 w 1653527"/>
+              <a:gd name="connsiteY2" fmla="*/ 0 h 668677"/>
+              <a:gd name="connsiteX3" fmla="*/ 1653527 w 1653527"/>
+              <a:gd name="connsiteY3" fmla="*/ 285614 h 668677"/>
+              <a:gd name="connsiteX4" fmla="*/ 1408491 w 1653527"/>
+              <a:gd name="connsiteY4" fmla="*/ 535071 h 668677"/>
+              <a:gd name="connsiteX5" fmla="*/ 1248065 w 1653527"/>
+              <a:gd name="connsiteY5" fmla="*/ 618928 h 668677"/>
+              <a:gd name="connsiteX6" fmla="*/ 96013 w 1653527"/>
+              <a:gd name="connsiteY6" fmla="*/ 668677 h 668677"/>
+              <a:gd name="connsiteX7" fmla="*/ 0 w 1653527"/>
+              <a:gd name="connsiteY7" fmla="*/ 572664 h 668677"/>
+              <a:gd name="connsiteX8" fmla="*/ 0 w 1653527"/>
+              <a:gd name="connsiteY8" fmla="*/ 188626 h 668677"/>
+              <a:gd name="connsiteX0" fmla="*/ 0 w 1653527"/>
+              <a:gd name="connsiteY0" fmla="*/ 222914 h 702965"/>
+              <a:gd name="connsiteX1" fmla="*/ 96013 w 1653527"/>
+              <a:gd name="connsiteY1" fmla="*/ 126901 h 702965"/>
+              <a:gd name="connsiteX2" fmla="*/ 935525 w 1653527"/>
+              <a:gd name="connsiteY2" fmla="*/ 15272 h 702965"/>
+              <a:gd name="connsiteX3" fmla="*/ 1259760 w 1653527"/>
+              <a:gd name="connsiteY3" fmla="*/ 34288 h 702965"/>
+              <a:gd name="connsiteX4" fmla="*/ 1653527 w 1653527"/>
+              <a:gd name="connsiteY4" fmla="*/ 319902 h 702965"/>
+              <a:gd name="connsiteX5" fmla="*/ 1408491 w 1653527"/>
+              <a:gd name="connsiteY5" fmla="*/ 569359 h 702965"/>
+              <a:gd name="connsiteX6" fmla="*/ 1248065 w 1653527"/>
+              <a:gd name="connsiteY6" fmla="*/ 653216 h 702965"/>
+              <a:gd name="connsiteX7" fmla="*/ 96013 w 1653527"/>
+              <a:gd name="connsiteY7" fmla="*/ 702965 h 702965"/>
+              <a:gd name="connsiteX8" fmla="*/ 0 w 1653527"/>
+              <a:gd name="connsiteY8" fmla="*/ 606952 h 702965"/>
+              <a:gd name="connsiteX9" fmla="*/ 0 w 1653527"/>
+              <a:gd name="connsiteY9" fmla="*/ 222914 h 702965"/>
+              <a:gd name="connsiteX0" fmla="*/ 0 w 1653527"/>
+              <a:gd name="connsiteY0" fmla="*/ 262323 h 742374"/>
+              <a:gd name="connsiteX1" fmla="*/ 96013 w 1653527"/>
+              <a:gd name="connsiteY1" fmla="*/ 166310 h 742374"/>
+              <a:gd name="connsiteX2" fmla="*/ 935525 w 1653527"/>
+              <a:gd name="connsiteY2" fmla="*/ 54681 h 742374"/>
+              <a:gd name="connsiteX3" fmla="*/ 1163946 w 1653527"/>
+              <a:gd name="connsiteY3" fmla="*/ 17756 h 742374"/>
+              <a:gd name="connsiteX4" fmla="*/ 1653527 w 1653527"/>
+              <a:gd name="connsiteY4" fmla="*/ 359311 h 742374"/>
+              <a:gd name="connsiteX5" fmla="*/ 1408491 w 1653527"/>
+              <a:gd name="connsiteY5" fmla="*/ 608768 h 742374"/>
+              <a:gd name="connsiteX6" fmla="*/ 1248065 w 1653527"/>
+              <a:gd name="connsiteY6" fmla="*/ 692625 h 742374"/>
+              <a:gd name="connsiteX7" fmla="*/ 96013 w 1653527"/>
+              <a:gd name="connsiteY7" fmla="*/ 742374 h 742374"/>
+              <a:gd name="connsiteX8" fmla="*/ 0 w 1653527"/>
+              <a:gd name="connsiteY8" fmla="*/ 646361 h 742374"/>
+              <a:gd name="connsiteX9" fmla="*/ 0 w 1653527"/>
+              <a:gd name="connsiteY9" fmla="*/ 262323 h 742374"/>
+              <a:gd name="connsiteX0" fmla="*/ 0 w 1653527"/>
+              <a:gd name="connsiteY0" fmla="*/ 281477 h 761528"/>
+              <a:gd name="connsiteX1" fmla="*/ 96013 w 1653527"/>
+              <a:gd name="connsiteY1" fmla="*/ 185464 h 761528"/>
+              <a:gd name="connsiteX2" fmla="*/ 866761 w 1653527"/>
+              <a:gd name="connsiteY2" fmla="*/ 13082 h 761528"/>
+              <a:gd name="connsiteX3" fmla="*/ 1163946 w 1653527"/>
+              <a:gd name="connsiteY3" fmla="*/ 36910 h 761528"/>
+              <a:gd name="connsiteX4" fmla="*/ 1653527 w 1653527"/>
+              <a:gd name="connsiteY4" fmla="*/ 378465 h 761528"/>
+              <a:gd name="connsiteX5" fmla="*/ 1408491 w 1653527"/>
+              <a:gd name="connsiteY5" fmla="*/ 627922 h 761528"/>
+              <a:gd name="connsiteX6" fmla="*/ 1248065 w 1653527"/>
+              <a:gd name="connsiteY6" fmla="*/ 711779 h 761528"/>
+              <a:gd name="connsiteX7" fmla="*/ 96013 w 1653527"/>
+              <a:gd name="connsiteY7" fmla="*/ 761528 h 761528"/>
+              <a:gd name="connsiteX8" fmla="*/ 0 w 1653527"/>
+              <a:gd name="connsiteY8" fmla="*/ 665515 h 761528"/>
+              <a:gd name="connsiteX9" fmla="*/ 0 w 1653527"/>
+              <a:gd name="connsiteY9" fmla="*/ 281477 h 761528"/>
+              <a:gd name="connsiteX0" fmla="*/ 1023 w 1654550"/>
+              <a:gd name="connsiteY0" fmla="*/ 281477 h 761528"/>
+              <a:gd name="connsiteX1" fmla="*/ 42684 w 1654550"/>
+              <a:gd name="connsiteY1" fmla="*/ 459161 h 761528"/>
+              <a:gd name="connsiteX2" fmla="*/ 867784 w 1654550"/>
+              <a:gd name="connsiteY2" fmla="*/ 13082 h 761528"/>
+              <a:gd name="connsiteX3" fmla="*/ 1164969 w 1654550"/>
+              <a:gd name="connsiteY3" fmla="*/ 36910 h 761528"/>
+              <a:gd name="connsiteX4" fmla="*/ 1654550 w 1654550"/>
+              <a:gd name="connsiteY4" fmla="*/ 378465 h 761528"/>
+              <a:gd name="connsiteX5" fmla="*/ 1409514 w 1654550"/>
+              <a:gd name="connsiteY5" fmla="*/ 627922 h 761528"/>
+              <a:gd name="connsiteX6" fmla="*/ 1249088 w 1654550"/>
+              <a:gd name="connsiteY6" fmla="*/ 711779 h 761528"/>
+              <a:gd name="connsiteX7" fmla="*/ 97036 w 1654550"/>
+              <a:gd name="connsiteY7" fmla="*/ 761528 h 761528"/>
+              <a:gd name="connsiteX8" fmla="*/ 1023 w 1654550"/>
+              <a:gd name="connsiteY8" fmla="*/ 665515 h 761528"/>
+              <a:gd name="connsiteX9" fmla="*/ 1023 w 1654550"/>
+              <a:gd name="connsiteY9" fmla="*/ 281477 h 761528"/>
+              <a:gd name="connsiteX0" fmla="*/ 0 w 1747544"/>
+              <a:gd name="connsiteY0" fmla="*/ 645947 h 761528"/>
+              <a:gd name="connsiteX1" fmla="*/ 135678 w 1747544"/>
+              <a:gd name="connsiteY1" fmla="*/ 459161 h 761528"/>
+              <a:gd name="connsiteX2" fmla="*/ 960778 w 1747544"/>
+              <a:gd name="connsiteY2" fmla="*/ 13082 h 761528"/>
+              <a:gd name="connsiteX3" fmla="*/ 1257963 w 1747544"/>
+              <a:gd name="connsiteY3" fmla="*/ 36910 h 761528"/>
+              <a:gd name="connsiteX4" fmla="*/ 1747544 w 1747544"/>
+              <a:gd name="connsiteY4" fmla="*/ 378465 h 761528"/>
+              <a:gd name="connsiteX5" fmla="*/ 1502508 w 1747544"/>
+              <a:gd name="connsiteY5" fmla="*/ 627922 h 761528"/>
+              <a:gd name="connsiteX6" fmla="*/ 1342082 w 1747544"/>
+              <a:gd name="connsiteY6" fmla="*/ 711779 h 761528"/>
+              <a:gd name="connsiteX7" fmla="*/ 190030 w 1747544"/>
+              <a:gd name="connsiteY7" fmla="*/ 761528 h 761528"/>
+              <a:gd name="connsiteX8" fmla="*/ 94017 w 1747544"/>
+              <a:gd name="connsiteY8" fmla="*/ 665515 h 761528"/>
+              <a:gd name="connsiteX9" fmla="*/ 0 w 1747544"/>
+              <a:gd name="connsiteY9" fmla="*/ 645947 h 761528"/>
+              <a:gd name="connsiteX0" fmla="*/ 0 w 1747544"/>
+              <a:gd name="connsiteY0" fmla="*/ 645947 h 1000624"/>
+              <a:gd name="connsiteX1" fmla="*/ 135678 w 1747544"/>
+              <a:gd name="connsiteY1" fmla="*/ 459161 h 1000624"/>
+              <a:gd name="connsiteX2" fmla="*/ 960778 w 1747544"/>
+              <a:gd name="connsiteY2" fmla="*/ 13082 h 1000624"/>
+              <a:gd name="connsiteX3" fmla="*/ 1257963 w 1747544"/>
+              <a:gd name="connsiteY3" fmla="*/ 36910 h 1000624"/>
+              <a:gd name="connsiteX4" fmla="*/ 1747544 w 1747544"/>
+              <a:gd name="connsiteY4" fmla="*/ 378465 h 1000624"/>
+              <a:gd name="connsiteX5" fmla="*/ 1502508 w 1747544"/>
+              <a:gd name="connsiteY5" fmla="*/ 627922 h 1000624"/>
+              <a:gd name="connsiteX6" fmla="*/ 1342082 w 1747544"/>
+              <a:gd name="connsiteY6" fmla="*/ 711779 h 1000624"/>
+              <a:gd name="connsiteX7" fmla="*/ 281930 w 1747544"/>
+              <a:gd name="connsiteY7" fmla="*/ 1000624 h 1000624"/>
+              <a:gd name="connsiteX8" fmla="*/ 94017 w 1747544"/>
+              <a:gd name="connsiteY8" fmla="*/ 665515 h 1000624"/>
+              <a:gd name="connsiteX9" fmla="*/ 0 w 1747544"/>
+              <a:gd name="connsiteY9" fmla="*/ 645947 h 1000624"/>
+              <a:gd name="connsiteX0" fmla="*/ 0 w 1747544"/>
+              <a:gd name="connsiteY0" fmla="*/ 645947 h 1000624"/>
+              <a:gd name="connsiteX1" fmla="*/ 135678 w 1747544"/>
+              <a:gd name="connsiteY1" fmla="*/ 459161 h 1000624"/>
+              <a:gd name="connsiteX2" fmla="*/ 960778 w 1747544"/>
+              <a:gd name="connsiteY2" fmla="*/ 13082 h 1000624"/>
+              <a:gd name="connsiteX3" fmla="*/ 1257963 w 1747544"/>
+              <a:gd name="connsiteY3" fmla="*/ 36910 h 1000624"/>
+              <a:gd name="connsiteX4" fmla="*/ 1747544 w 1747544"/>
+              <a:gd name="connsiteY4" fmla="*/ 378465 h 1000624"/>
+              <a:gd name="connsiteX5" fmla="*/ 1502508 w 1747544"/>
+              <a:gd name="connsiteY5" fmla="*/ 627922 h 1000624"/>
+              <a:gd name="connsiteX6" fmla="*/ 1342082 w 1747544"/>
+              <a:gd name="connsiteY6" fmla="*/ 711779 h 1000624"/>
+              <a:gd name="connsiteX7" fmla="*/ 281930 w 1747544"/>
+              <a:gd name="connsiteY7" fmla="*/ 1000624 h 1000624"/>
+              <a:gd name="connsiteX8" fmla="*/ 94017 w 1747544"/>
+              <a:gd name="connsiteY8" fmla="*/ 665515 h 1000624"/>
+              <a:gd name="connsiteX9" fmla="*/ 0 w 1747544"/>
+              <a:gd name="connsiteY9" fmla="*/ 645947 h 1000624"/>
+              <a:gd name="connsiteX0" fmla="*/ 0 w 1747544"/>
+              <a:gd name="connsiteY0" fmla="*/ 645947 h 1000624"/>
+              <a:gd name="connsiteX1" fmla="*/ 135678 w 1747544"/>
+              <a:gd name="connsiteY1" fmla="*/ 459161 h 1000624"/>
+              <a:gd name="connsiteX2" fmla="*/ 960778 w 1747544"/>
+              <a:gd name="connsiteY2" fmla="*/ 13082 h 1000624"/>
+              <a:gd name="connsiteX3" fmla="*/ 1257963 w 1747544"/>
+              <a:gd name="connsiteY3" fmla="*/ 36910 h 1000624"/>
+              <a:gd name="connsiteX4" fmla="*/ 1747544 w 1747544"/>
+              <a:gd name="connsiteY4" fmla="*/ 378465 h 1000624"/>
+              <a:gd name="connsiteX5" fmla="*/ 1502508 w 1747544"/>
+              <a:gd name="connsiteY5" fmla="*/ 627922 h 1000624"/>
+              <a:gd name="connsiteX6" fmla="*/ 1342082 w 1747544"/>
+              <a:gd name="connsiteY6" fmla="*/ 711779 h 1000624"/>
+              <a:gd name="connsiteX7" fmla="*/ 1171858 w 1747544"/>
+              <a:gd name="connsiteY7" fmla="*/ 475689 h 1000624"/>
+              <a:gd name="connsiteX8" fmla="*/ 281930 w 1747544"/>
+              <a:gd name="connsiteY8" fmla="*/ 1000624 h 1000624"/>
+              <a:gd name="connsiteX9" fmla="*/ 94017 w 1747544"/>
+              <a:gd name="connsiteY9" fmla="*/ 665515 h 1000624"/>
+              <a:gd name="connsiteX10" fmla="*/ 0 w 1747544"/>
+              <a:gd name="connsiteY10" fmla="*/ 645947 h 1000624"/>
+              <a:gd name="connsiteX0" fmla="*/ 0 w 1747544"/>
+              <a:gd name="connsiteY0" fmla="*/ 645947 h 1000624"/>
+              <a:gd name="connsiteX1" fmla="*/ 135678 w 1747544"/>
+              <a:gd name="connsiteY1" fmla="*/ 459161 h 1000624"/>
+              <a:gd name="connsiteX2" fmla="*/ 960778 w 1747544"/>
+              <a:gd name="connsiteY2" fmla="*/ 13082 h 1000624"/>
+              <a:gd name="connsiteX3" fmla="*/ 1257963 w 1747544"/>
+              <a:gd name="connsiteY3" fmla="*/ 36910 h 1000624"/>
+              <a:gd name="connsiteX4" fmla="*/ 1747544 w 1747544"/>
+              <a:gd name="connsiteY4" fmla="*/ 378465 h 1000624"/>
+              <a:gd name="connsiteX5" fmla="*/ 1502508 w 1747544"/>
+              <a:gd name="connsiteY5" fmla="*/ 627922 h 1000624"/>
+              <a:gd name="connsiteX6" fmla="*/ 1342082 w 1747544"/>
+              <a:gd name="connsiteY6" fmla="*/ 711779 h 1000624"/>
+              <a:gd name="connsiteX7" fmla="*/ 1171858 w 1747544"/>
+              <a:gd name="connsiteY7" fmla="*/ 475689 h 1000624"/>
+              <a:gd name="connsiteX8" fmla="*/ 281930 w 1747544"/>
+              <a:gd name="connsiteY8" fmla="*/ 1000624 h 1000624"/>
+              <a:gd name="connsiteX9" fmla="*/ 94017 w 1747544"/>
+              <a:gd name="connsiteY9" fmla="*/ 665515 h 1000624"/>
+              <a:gd name="connsiteX10" fmla="*/ 0 w 1747544"/>
+              <a:gd name="connsiteY10" fmla="*/ 645947 h 1000624"/>
+              <a:gd name="connsiteX0" fmla="*/ 0 w 1747544"/>
+              <a:gd name="connsiteY0" fmla="*/ 645947 h 1000624"/>
+              <a:gd name="connsiteX1" fmla="*/ 135678 w 1747544"/>
+              <a:gd name="connsiteY1" fmla="*/ 459161 h 1000624"/>
+              <a:gd name="connsiteX2" fmla="*/ 960778 w 1747544"/>
+              <a:gd name="connsiteY2" fmla="*/ 13082 h 1000624"/>
+              <a:gd name="connsiteX3" fmla="*/ 1257963 w 1747544"/>
+              <a:gd name="connsiteY3" fmla="*/ 36910 h 1000624"/>
+              <a:gd name="connsiteX4" fmla="*/ 1747544 w 1747544"/>
+              <a:gd name="connsiteY4" fmla="*/ 378465 h 1000624"/>
+              <a:gd name="connsiteX5" fmla="*/ 1502508 w 1747544"/>
+              <a:gd name="connsiteY5" fmla="*/ 627922 h 1000624"/>
+              <a:gd name="connsiteX6" fmla="*/ 1342082 w 1747544"/>
+              <a:gd name="connsiteY6" fmla="*/ 711779 h 1000624"/>
+              <a:gd name="connsiteX7" fmla="*/ 1131962 w 1747544"/>
+              <a:gd name="connsiteY7" fmla="*/ 577235 h 1000624"/>
+              <a:gd name="connsiteX8" fmla="*/ 281930 w 1747544"/>
+              <a:gd name="connsiteY8" fmla="*/ 1000624 h 1000624"/>
+              <a:gd name="connsiteX9" fmla="*/ 94017 w 1747544"/>
+              <a:gd name="connsiteY9" fmla="*/ 665515 h 1000624"/>
+              <a:gd name="connsiteX10" fmla="*/ 0 w 1747544"/>
+              <a:gd name="connsiteY10" fmla="*/ 645947 h 1000624"/>
+              <a:gd name="connsiteX0" fmla="*/ 0 w 1747544"/>
+              <a:gd name="connsiteY0" fmla="*/ 645947 h 1000624"/>
+              <a:gd name="connsiteX1" fmla="*/ 135678 w 1747544"/>
+              <a:gd name="connsiteY1" fmla="*/ 459161 h 1000624"/>
+              <a:gd name="connsiteX2" fmla="*/ 960778 w 1747544"/>
+              <a:gd name="connsiteY2" fmla="*/ 13082 h 1000624"/>
+              <a:gd name="connsiteX3" fmla="*/ 1257963 w 1747544"/>
+              <a:gd name="connsiteY3" fmla="*/ 36910 h 1000624"/>
+              <a:gd name="connsiteX4" fmla="*/ 1747544 w 1747544"/>
+              <a:gd name="connsiteY4" fmla="*/ 378465 h 1000624"/>
+              <a:gd name="connsiteX5" fmla="*/ 1502508 w 1747544"/>
+              <a:gd name="connsiteY5" fmla="*/ 627922 h 1000624"/>
+              <a:gd name="connsiteX6" fmla="*/ 1342082 w 1747544"/>
+              <a:gd name="connsiteY6" fmla="*/ 711779 h 1000624"/>
+              <a:gd name="connsiteX7" fmla="*/ 1114765 w 1747544"/>
+              <a:gd name="connsiteY7" fmla="*/ 625372 h 1000624"/>
+              <a:gd name="connsiteX8" fmla="*/ 281930 w 1747544"/>
+              <a:gd name="connsiteY8" fmla="*/ 1000624 h 1000624"/>
+              <a:gd name="connsiteX9" fmla="*/ 94017 w 1747544"/>
+              <a:gd name="connsiteY9" fmla="*/ 665515 h 1000624"/>
+              <a:gd name="connsiteX10" fmla="*/ 0 w 1747544"/>
+              <a:gd name="connsiteY10" fmla="*/ 645947 h 1000624"/>
+              <a:gd name="connsiteX0" fmla="*/ 0 w 1747544"/>
+              <a:gd name="connsiteY0" fmla="*/ 645947 h 1000624"/>
+              <a:gd name="connsiteX1" fmla="*/ 135678 w 1747544"/>
+              <a:gd name="connsiteY1" fmla="*/ 459161 h 1000624"/>
+              <a:gd name="connsiteX2" fmla="*/ 960778 w 1747544"/>
+              <a:gd name="connsiteY2" fmla="*/ 13082 h 1000624"/>
+              <a:gd name="connsiteX3" fmla="*/ 1257963 w 1747544"/>
+              <a:gd name="connsiteY3" fmla="*/ 36910 h 1000624"/>
+              <a:gd name="connsiteX4" fmla="*/ 1747544 w 1747544"/>
+              <a:gd name="connsiteY4" fmla="*/ 378465 h 1000624"/>
+              <a:gd name="connsiteX5" fmla="*/ 1502508 w 1747544"/>
+              <a:gd name="connsiteY5" fmla="*/ 627922 h 1000624"/>
+              <a:gd name="connsiteX6" fmla="*/ 1342082 w 1747544"/>
+              <a:gd name="connsiteY6" fmla="*/ 711779 h 1000624"/>
+              <a:gd name="connsiteX7" fmla="*/ 1215621 w 1747544"/>
+              <a:gd name="connsiteY7" fmla="*/ 697589 h 1000624"/>
+              <a:gd name="connsiteX8" fmla="*/ 1114765 w 1747544"/>
+              <a:gd name="connsiteY8" fmla="*/ 625372 h 1000624"/>
+              <a:gd name="connsiteX9" fmla="*/ 281930 w 1747544"/>
+              <a:gd name="connsiteY9" fmla="*/ 1000624 h 1000624"/>
+              <a:gd name="connsiteX10" fmla="*/ 94017 w 1747544"/>
+              <a:gd name="connsiteY10" fmla="*/ 665515 h 1000624"/>
+              <a:gd name="connsiteX11" fmla="*/ 0 w 1747544"/>
+              <a:gd name="connsiteY11" fmla="*/ 645947 h 1000624"/>
+              <a:gd name="connsiteX0" fmla="*/ 0 w 1747544"/>
+              <a:gd name="connsiteY0" fmla="*/ 645947 h 1000624"/>
+              <a:gd name="connsiteX1" fmla="*/ 135678 w 1747544"/>
+              <a:gd name="connsiteY1" fmla="*/ 459161 h 1000624"/>
+              <a:gd name="connsiteX2" fmla="*/ 960778 w 1747544"/>
+              <a:gd name="connsiteY2" fmla="*/ 13082 h 1000624"/>
+              <a:gd name="connsiteX3" fmla="*/ 1257963 w 1747544"/>
+              <a:gd name="connsiteY3" fmla="*/ 36910 h 1000624"/>
+              <a:gd name="connsiteX4" fmla="*/ 1747544 w 1747544"/>
+              <a:gd name="connsiteY4" fmla="*/ 378465 h 1000624"/>
+              <a:gd name="connsiteX5" fmla="*/ 1502508 w 1747544"/>
+              <a:gd name="connsiteY5" fmla="*/ 627922 h 1000624"/>
+              <a:gd name="connsiteX6" fmla="*/ 1342082 w 1747544"/>
+              <a:gd name="connsiteY6" fmla="*/ 711779 h 1000624"/>
+              <a:gd name="connsiteX7" fmla="*/ 1297433 w 1747544"/>
+              <a:gd name="connsiteY7" fmla="*/ 652180 h 1000624"/>
+              <a:gd name="connsiteX8" fmla="*/ 1114765 w 1747544"/>
+              <a:gd name="connsiteY8" fmla="*/ 625372 h 1000624"/>
+              <a:gd name="connsiteX9" fmla="*/ 281930 w 1747544"/>
+              <a:gd name="connsiteY9" fmla="*/ 1000624 h 1000624"/>
+              <a:gd name="connsiteX10" fmla="*/ 94017 w 1747544"/>
+              <a:gd name="connsiteY10" fmla="*/ 665515 h 1000624"/>
+              <a:gd name="connsiteX11" fmla="*/ 0 w 1747544"/>
+              <a:gd name="connsiteY11" fmla="*/ 645947 h 1000624"/>
+              <a:gd name="connsiteX0" fmla="*/ 0 w 1747544"/>
+              <a:gd name="connsiteY0" fmla="*/ 645947 h 1000624"/>
+              <a:gd name="connsiteX1" fmla="*/ 135678 w 1747544"/>
+              <a:gd name="connsiteY1" fmla="*/ 459161 h 1000624"/>
+              <a:gd name="connsiteX2" fmla="*/ 960778 w 1747544"/>
+              <a:gd name="connsiteY2" fmla="*/ 13082 h 1000624"/>
+              <a:gd name="connsiteX3" fmla="*/ 1257963 w 1747544"/>
+              <a:gd name="connsiteY3" fmla="*/ 36910 h 1000624"/>
+              <a:gd name="connsiteX4" fmla="*/ 1747544 w 1747544"/>
+              <a:gd name="connsiteY4" fmla="*/ 378465 h 1000624"/>
+              <a:gd name="connsiteX5" fmla="*/ 1502508 w 1747544"/>
+              <a:gd name="connsiteY5" fmla="*/ 627922 h 1000624"/>
+              <a:gd name="connsiteX6" fmla="*/ 1352974 w 1747544"/>
+              <a:gd name="connsiteY6" fmla="*/ 674960 h 1000624"/>
+              <a:gd name="connsiteX7" fmla="*/ 1297433 w 1747544"/>
+              <a:gd name="connsiteY7" fmla="*/ 652180 h 1000624"/>
+              <a:gd name="connsiteX8" fmla="*/ 1114765 w 1747544"/>
+              <a:gd name="connsiteY8" fmla="*/ 625372 h 1000624"/>
+              <a:gd name="connsiteX9" fmla="*/ 281930 w 1747544"/>
+              <a:gd name="connsiteY9" fmla="*/ 1000624 h 1000624"/>
+              <a:gd name="connsiteX10" fmla="*/ 94017 w 1747544"/>
+              <a:gd name="connsiteY10" fmla="*/ 665515 h 1000624"/>
+              <a:gd name="connsiteX11" fmla="*/ 0 w 1747544"/>
+              <a:gd name="connsiteY11" fmla="*/ 645947 h 1000624"/>
+              <a:gd name="connsiteX0" fmla="*/ 0 w 1747544"/>
+              <a:gd name="connsiteY0" fmla="*/ 645947 h 1000624"/>
+              <a:gd name="connsiteX1" fmla="*/ 135678 w 1747544"/>
+              <a:gd name="connsiteY1" fmla="*/ 459161 h 1000624"/>
+              <a:gd name="connsiteX2" fmla="*/ 960778 w 1747544"/>
+              <a:gd name="connsiteY2" fmla="*/ 13082 h 1000624"/>
+              <a:gd name="connsiteX3" fmla="*/ 1257963 w 1747544"/>
+              <a:gd name="connsiteY3" fmla="*/ 36910 h 1000624"/>
+              <a:gd name="connsiteX4" fmla="*/ 1747544 w 1747544"/>
+              <a:gd name="connsiteY4" fmla="*/ 378465 h 1000624"/>
+              <a:gd name="connsiteX5" fmla="*/ 1502508 w 1747544"/>
+              <a:gd name="connsiteY5" fmla="*/ 627922 h 1000624"/>
+              <a:gd name="connsiteX6" fmla="*/ 1352974 w 1747544"/>
+              <a:gd name="connsiteY6" fmla="*/ 674960 h 1000624"/>
+              <a:gd name="connsiteX7" fmla="*/ 1297433 w 1747544"/>
+              <a:gd name="connsiteY7" fmla="*/ 652180 h 1000624"/>
+              <a:gd name="connsiteX8" fmla="*/ 1095571 w 1747544"/>
+              <a:gd name="connsiteY8" fmla="*/ 577805 h 1000624"/>
+              <a:gd name="connsiteX9" fmla="*/ 281930 w 1747544"/>
+              <a:gd name="connsiteY9" fmla="*/ 1000624 h 1000624"/>
+              <a:gd name="connsiteX10" fmla="*/ 94017 w 1747544"/>
+              <a:gd name="connsiteY10" fmla="*/ 665515 h 1000624"/>
+              <a:gd name="connsiteX11" fmla="*/ 0 w 1747544"/>
+              <a:gd name="connsiteY11" fmla="*/ 645947 h 1000624"/>
+              <a:gd name="connsiteX0" fmla="*/ 0 w 1747544"/>
+              <a:gd name="connsiteY0" fmla="*/ 645947 h 1000624"/>
+              <a:gd name="connsiteX1" fmla="*/ 135678 w 1747544"/>
+              <a:gd name="connsiteY1" fmla="*/ 459161 h 1000624"/>
+              <a:gd name="connsiteX2" fmla="*/ 960778 w 1747544"/>
+              <a:gd name="connsiteY2" fmla="*/ 13082 h 1000624"/>
+              <a:gd name="connsiteX3" fmla="*/ 1257963 w 1747544"/>
+              <a:gd name="connsiteY3" fmla="*/ 36910 h 1000624"/>
+              <a:gd name="connsiteX4" fmla="*/ 1747544 w 1747544"/>
+              <a:gd name="connsiteY4" fmla="*/ 378465 h 1000624"/>
+              <a:gd name="connsiteX5" fmla="*/ 1502508 w 1747544"/>
+              <a:gd name="connsiteY5" fmla="*/ 627922 h 1000624"/>
+              <a:gd name="connsiteX6" fmla="*/ 1352974 w 1747544"/>
+              <a:gd name="connsiteY6" fmla="*/ 674960 h 1000624"/>
+              <a:gd name="connsiteX7" fmla="*/ 1297433 w 1747544"/>
+              <a:gd name="connsiteY7" fmla="*/ 652180 h 1000624"/>
+              <a:gd name="connsiteX8" fmla="*/ 1095571 w 1747544"/>
+              <a:gd name="connsiteY8" fmla="*/ 577805 h 1000624"/>
+              <a:gd name="connsiteX9" fmla="*/ 281930 w 1747544"/>
+              <a:gd name="connsiteY9" fmla="*/ 1000624 h 1000624"/>
+              <a:gd name="connsiteX10" fmla="*/ 94017 w 1747544"/>
+              <a:gd name="connsiteY10" fmla="*/ 665515 h 1000624"/>
+              <a:gd name="connsiteX11" fmla="*/ 0 w 1747544"/>
+              <a:gd name="connsiteY11" fmla="*/ 645947 h 1000624"/>
+              <a:gd name="connsiteX0" fmla="*/ 0 w 1747544"/>
+              <a:gd name="connsiteY0" fmla="*/ 645947 h 1000624"/>
+              <a:gd name="connsiteX1" fmla="*/ 135678 w 1747544"/>
+              <a:gd name="connsiteY1" fmla="*/ 459161 h 1000624"/>
+              <a:gd name="connsiteX2" fmla="*/ 960778 w 1747544"/>
+              <a:gd name="connsiteY2" fmla="*/ 13082 h 1000624"/>
+              <a:gd name="connsiteX3" fmla="*/ 1257963 w 1747544"/>
+              <a:gd name="connsiteY3" fmla="*/ 36910 h 1000624"/>
+              <a:gd name="connsiteX4" fmla="*/ 1747544 w 1747544"/>
+              <a:gd name="connsiteY4" fmla="*/ 378465 h 1000624"/>
+              <a:gd name="connsiteX5" fmla="*/ 1502508 w 1747544"/>
+              <a:gd name="connsiteY5" fmla="*/ 627922 h 1000624"/>
+              <a:gd name="connsiteX6" fmla="*/ 1352974 w 1747544"/>
+              <a:gd name="connsiteY6" fmla="*/ 674960 h 1000624"/>
+              <a:gd name="connsiteX7" fmla="*/ 1297433 w 1747544"/>
+              <a:gd name="connsiteY7" fmla="*/ 652180 h 1000624"/>
+              <a:gd name="connsiteX8" fmla="*/ 1095571 w 1747544"/>
+              <a:gd name="connsiteY8" fmla="*/ 577805 h 1000624"/>
+              <a:gd name="connsiteX9" fmla="*/ 281930 w 1747544"/>
+              <a:gd name="connsiteY9" fmla="*/ 1000624 h 1000624"/>
+              <a:gd name="connsiteX10" fmla="*/ 94017 w 1747544"/>
+              <a:gd name="connsiteY10" fmla="*/ 665515 h 1000624"/>
+              <a:gd name="connsiteX11" fmla="*/ 0 w 1747544"/>
+              <a:gd name="connsiteY11" fmla="*/ 645947 h 1000624"/>
+              <a:gd name="connsiteX0" fmla="*/ 0 w 1876074"/>
+              <a:gd name="connsiteY0" fmla="*/ 828460 h 1000624"/>
+              <a:gd name="connsiteX1" fmla="*/ 264208 w 1876074"/>
+              <a:gd name="connsiteY1" fmla="*/ 459161 h 1000624"/>
+              <a:gd name="connsiteX2" fmla="*/ 1089308 w 1876074"/>
+              <a:gd name="connsiteY2" fmla="*/ 13082 h 1000624"/>
+              <a:gd name="connsiteX3" fmla="*/ 1386493 w 1876074"/>
+              <a:gd name="connsiteY3" fmla="*/ 36910 h 1000624"/>
+              <a:gd name="connsiteX4" fmla="*/ 1876074 w 1876074"/>
+              <a:gd name="connsiteY4" fmla="*/ 378465 h 1000624"/>
+              <a:gd name="connsiteX5" fmla="*/ 1631038 w 1876074"/>
+              <a:gd name="connsiteY5" fmla="*/ 627922 h 1000624"/>
+              <a:gd name="connsiteX6" fmla="*/ 1481504 w 1876074"/>
+              <a:gd name="connsiteY6" fmla="*/ 674960 h 1000624"/>
+              <a:gd name="connsiteX7" fmla="*/ 1425963 w 1876074"/>
+              <a:gd name="connsiteY7" fmla="*/ 652180 h 1000624"/>
+              <a:gd name="connsiteX8" fmla="*/ 1224101 w 1876074"/>
+              <a:gd name="connsiteY8" fmla="*/ 577805 h 1000624"/>
+              <a:gd name="connsiteX9" fmla="*/ 410460 w 1876074"/>
+              <a:gd name="connsiteY9" fmla="*/ 1000624 h 1000624"/>
+              <a:gd name="connsiteX10" fmla="*/ 222547 w 1876074"/>
+              <a:gd name="connsiteY10" fmla="*/ 665515 h 1000624"/>
+              <a:gd name="connsiteX11" fmla="*/ 0 w 1876074"/>
+              <a:gd name="connsiteY11" fmla="*/ 828460 h 1000624"/>
+              <a:gd name="connsiteX0" fmla="*/ 0 w 1876074"/>
+              <a:gd name="connsiteY0" fmla="*/ 828460 h 1121942"/>
+              <a:gd name="connsiteX1" fmla="*/ 264208 w 1876074"/>
+              <a:gd name="connsiteY1" fmla="*/ 459161 h 1121942"/>
+              <a:gd name="connsiteX2" fmla="*/ 1089308 w 1876074"/>
+              <a:gd name="connsiteY2" fmla="*/ 13082 h 1121942"/>
+              <a:gd name="connsiteX3" fmla="*/ 1386493 w 1876074"/>
+              <a:gd name="connsiteY3" fmla="*/ 36910 h 1121942"/>
+              <a:gd name="connsiteX4" fmla="*/ 1876074 w 1876074"/>
+              <a:gd name="connsiteY4" fmla="*/ 378465 h 1121942"/>
+              <a:gd name="connsiteX5" fmla="*/ 1631038 w 1876074"/>
+              <a:gd name="connsiteY5" fmla="*/ 627922 h 1121942"/>
+              <a:gd name="connsiteX6" fmla="*/ 1481504 w 1876074"/>
+              <a:gd name="connsiteY6" fmla="*/ 674960 h 1121942"/>
+              <a:gd name="connsiteX7" fmla="*/ 1425963 w 1876074"/>
+              <a:gd name="connsiteY7" fmla="*/ 652180 h 1121942"/>
+              <a:gd name="connsiteX8" fmla="*/ 1224101 w 1876074"/>
+              <a:gd name="connsiteY8" fmla="*/ 577805 h 1121942"/>
+              <a:gd name="connsiteX9" fmla="*/ 410460 w 1876074"/>
+              <a:gd name="connsiteY9" fmla="*/ 1000624 h 1121942"/>
+              <a:gd name="connsiteX10" fmla="*/ 280388 w 1876074"/>
+              <a:gd name="connsiteY10" fmla="*/ 1111375 h 1121942"/>
+              <a:gd name="connsiteX11" fmla="*/ 0 w 1876074"/>
+              <a:gd name="connsiteY11" fmla="*/ 828460 h 1121942"/>
+              <a:gd name="connsiteX0" fmla="*/ 0 w 1876074"/>
+              <a:gd name="connsiteY0" fmla="*/ 828460 h 1124135"/>
+              <a:gd name="connsiteX1" fmla="*/ 264208 w 1876074"/>
+              <a:gd name="connsiteY1" fmla="*/ 459161 h 1124135"/>
+              <a:gd name="connsiteX2" fmla="*/ 1089308 w 1876074"/>
+              <a:gd name="connsiteY2" fmla="*/ 13082 h 1124135"/>
+              <a:gd name="connsiteX3" fmla="*/ 1386493 w 1876074"/>
+              <a:gd name="connsiteY3" fmla="*/ 36910 h 1124135"/>
+              <a:gd name="connsiteX4" fmla="*/ 1876074 w 1876074"/>
+              <a:gd name="connsiteY4" fmla="*/ 378465 h 1124135"/>
+              <a:gd name="connsiteX5" fmla="*/ 1631038 w 1876074"/>
+              <a:gd name="connsiteY5" fmla="*/ 627922 h 1124135"/>
+              <a:gd name="connsiteX6" fmla="*/ 1481504 w 1876074"/>
+              <a:gd name="connsiteY6" fmla="*/ 674960 h 1124135"/>
+              <a:gd name="connsiteX7" fmla="*/ 1425963 w 1876074"/>
+              <a:gd name="connsiteY7" fmla="*/ 652180 h 1124135"/>
+              <a:gd name="connsiteX8" fmla="*/ 1224101 w 1876074"/>
+              <a:gd name="connsiteY8" fmla="*/ 577805 h 1124135"/>
+              <a:gd name="connsiteX9" fmla="*/ 443409 w 1876074"/>
+              <a:gd name="connsiteY9" fmla="*/ 1035012 h 1124135"/>
+              <a:gd name="connsiteX10" fmla="*/ 280388 w 1876074"/>
+              <a:gd name="connsiteY10" fmla="*/ 1111375 h 1124135"/>
+              <a:gd name="connsiteX11" fmla="*/ 0 w 1876074"/>
+              <a:gd name="connsiteY11" fmla="*/ 828460 h 1124135"/>
+              <a:gd name="connsiteX0" fmla="*/ 0 w 1876074"/>
+              <a:gd name="connsiteY0" fmla="*/ 828460 h 1161400"/>
+              <a:gd name="connsiteX1" fmla="*/ 264208 w 1876074"/>
+              <a:gd name="connsiteY1" fmla="*/ 459161 h 1161400"/>
+              <a:gd name="connsiteX2" fmla="*/ 1089308 w 1876074"/>
+              <a:gd name="connsiteY2" fmla="*/ 13082 h 1161400"/>
+              <a:gd name="connsiteX3" fmla="*/ 1386493 w 1876074"/>
+              <a:gd name="connsiteY3" fmla="*/ 36910 h 1161400"/>
+              <a:gd name="connsiteX4" fmla="*/ 1876074 w 1876074"/>
+              <a:gd name="connsiteY4" fmla="*/ 378465 h 1161400"/>
+              <a:gd name="connsiteX5" fmla="*/ 1631038 w 1876074"/>
+              <a:gd name="connsiteY5" fmla="*/ 627922 h 1161400"/>
+              <a:gd name="connsiteX6" fmla="*/ 1481504 w 1876074"/>
+              <a:gd name="connsiteY6" fmla="*/ 674960 h 1161400"/>
+              <a:gd name="connsiteX7" fmla="*/ 1425963 w 1876074"/>
+              <a:gd name="connsiteY7" fmla="*/ 652180 h 1161400"/>
+              <a:gd name="connsiteX8" fmla="*/ 1224101 w 1876074"/>
+              <a:gd name="connsiteY8" fmla="*/ 577805 h 1161400"/>
+              <a:gd name="connsiteX9" fmla="*/ 366605 w 1876074"/>
+              <a:gd name="connsiteY9" fmla="*/ 1161369 h 1161400"/>
+              <a:gd name="connsiteX10" fmla="*/ 280388 w 1876074"/>
+              <a:gd name="connsiteY10" fmla="*/ 1111375 h 1161400"/>
+              <a:gd name="connsiteX11" fmla="*/ 0 w 1876074"/>
+              <a:gd name="connsiteY11" fmla="*/ 828460 h 1161400"/>
+              <a:gd name="connsiteX0" fmla="*/ 0 w 1876074"/>
+              <a:gd name="connsiteY0" fmla="*/ 828460 h 1161400"/>
+              <a:gd name="connsiteX1" fmla="*/ 264208 w 1876074"/>
+              <a:gd name="connsiteY1" fmla="*/ 459161 h 1161400"/>
+              <a:gd name="connsiteX2" fmla="*/ 1089308 w 1876074"/>
+              <a:gd name="connsiteY2" fmla="*/ 13082 h 1161400"/>
+              <a:gd name="connsiteX3" fmla="*/ 1386493 w 1876074"/>
+              <a:gd name="connsiteY3" fmla="*/ 36910 h 1161400"/>
+              <a:gd name="connsiteX4" fmla="*/ 1876074 w 1876074"/>
+              <a:gd name="connsiteY4" fmla="*/ 378465 h 1161400"/>
+              <a:gd name="connsiteX5" fmla="*/ 1515694 w 1876074"/>
+              <a:gd name="connsiteY5" fmla="*/ 745034 h 1161400"/>
+              <a:gd name="connsiteX6" fmla="*/ 1481504 w 1876074"/>
+              <a:gd name="connsiteY6" fmla="*/ 674960 h 1161400"/>
+              <a:gd name="connsiteX7" fmla="*/ 1425963 w 1876074"/>
+              <a:gd name="connsiteY7" fmla="*/ 652180 h 1161400"/>
+              <a:gd name="connsiteX8" fmla="*/ 1224101 w 1876074"/>
+              <a:gd name="connsiteY8" fmla="*/ 577805 h 1161400"/>
+              <a:gd name="connsiteX9" fmla="*/ 366605 w 1876074"/>
+              <a:gd name="connsiteY9" fmla="*/ 1161369 h 1161400"/>
+              <a:gd name="connsiteX10" fmla="*/ 280388 w 1876074"/>
+              <a:gd name="connsiteY10" fmla="*/ 1111375 h 1161400"/>
+              <a:gd name="connsiteX11" fmla="*/ 0 w 1876074"/>
+              <a:gd name="connsiteY11" fmla="*/ 828460 h 1161400"/>
+              <a:gd name="connsiteX0" fmla="*/ 0 w 1876074"/>
+              <a:gd name="connsiteY0" fmla="*/ 828460 h 1161400"/>
+              <a:gd name="connsiteX1" fmla="*/ 264208 w 1876074"/>
+              <a:gd name="connsiteY1" fmla="*/ 459161 h 1161400"/>
+              <a:gd name="connsiteX2" fmla="*/ 1089308 w 1876074"/>
+              <a:gd name="connsiteY2" fmla="*/ 13082 h 1161400"/>
+              <a:gd name="connsiteX3" fmla="*/ 1386493 w 1876074"/>
+              <a:gd name="connsiteY3" fmla="*/ 36910 h 1161400"/>
+              <a:gd name="connsiteX4" fmla="*/ 1876074 w 1876074"/>
+              <a:gd name="connsiteY4" fmla="*/ 378465 h 1161400"/>
+              <a:gd name="connsiteX5" fmla="*/ 1515694 w 1876074"/>
+              <a:gd name="connsiteY5" fmla="*/ 745034 h 1161400"/>
+              <a:gd name="connsiteX6" fmla="*/ 1458864 w 1876074"/>
+              <a:gd name="connsiteY6" fmla="*/ 709845 h 1161400"/>
+              <a:gd name="connsiteX7" fmla="*/ 1425963 w 1876074"/>
+              <a:gd name="connsiteY7" fmla="*/ 652180 h 1161400"/>
+              <a:gd name="connsiteX8" fmla="*/ 1224101 w 1876074"/>
+              <a:gd name="connsiteY8" fmla="*/ 577805 h 1161400"/>
+              <a:gd name="connsiteX9" fmla="*/ 366605 w 1876074"/>
+              <a:gd name="connsiteY9" fmla="*/ 1161369 h 1161400"/>
+              <a:gd name="connsiteX10" fmla="*/ 280388 w 1876074"/>
+              <a:gd name="connsiteY10" fmla="*/ 1111375 h 1161400"/>
+              <a:gd name="connsiteX11" fmla="*/ 0 w 1876074"/>
+              <a:gd name="connsiteY11" fmla="*/ 828460 h 1161400"/>
+              <a:gd name="connsiteX0" fmla="*/ 0 w 1876074"/>
+              <a:gd name="connsiteY0" fmla="*/ 828460 h 1161400"/>
+              <a:gd name="connsiteX1" fmla="*/ 264208 w 1876074"/>
+              <a:gd name="connsiteY1" fmla="*/ 459161 h 1161400"/>
+              <a:gd name="connsiteX2" fmla="*/ 1089308 w 1876074"/>
+              <a:gd name="connsiteY2" fmla="*/ 13082 h 1161400"/>
+              <a:gd name="connsiteX3" fmla="*/ 1386493 w 1876074"/>
+              <a:gd name="connsiteY3" fmla="*/ 36910 h 1161400"/>
+              <a:gd name="connsiteX4" fmla="*/ 1876074 w 1876074"/>
+              <a:gd name="connsiteY4" fmla="*/ 378465 h 1161400"/>
+              <a:gd name="connsiteX5" fmla="*/ 1515694 w 1876074"/>
+              <a:gd name="connsiteY5" fmla="*/ 745034 h 1161400"/>
+              <a:gd name="connsiteX6" fmla="*/ 1458864 w 1876074"/>
+              <a:gd name="connsiteY6" fmla="*/ 709845 h 1161400"/>
+              <a:gd name="connsiteX7" fmla="*/ 1403466 w 1876074"/>
+              <a:gd name="connsiteY7" fmla="*/ 680330 h 1161400"/>
+              <a:gd name="connsiteX8" fmla="*/ 1224101 w 1876074"/>
+              <a:gd name="connsiteY8" fmla="*/ 577805 h 1161400"/>
+              <a:gd name="connsiteX9" fmla="*/ 366605 w 1876074"/>
+              <a:gd name="connsiteY9" fmla="*/ 1161369 h 1161400"/>
+              <a:gd name="connsiteX10" fmla="*/ 280388 w 1876074"/>
+              <a:gd name="connsiteY10" fmla="*/ 1111375 h 1161400"/>
+              <a:gd name="connsiteX11" fmla="*/ 0 w 1876074"/>
+              <a:gd name="connsiteY11" fmla="*/ 828460 h 1161400"/>
+              <a:gd name="connsiteX0" fmla="*/ 0 w 1876074"/>
+              <a:gd name="connsiteY0" fmla="*/ 828460 h 1161400"/>
+              <a:gd name="connsiteX1" fmla="*/ 264208 w 1876074"/>
+              <a:gd name="connsiteY1" fmla="*/ 459161 h 1161400"/>
+              <a:gd name="connsiteX2" fmla="*/ 1089308 w 1876074"/>
+              <a:gd name="connsiteY2" fmla="*/ 13082 h 1161400"/>
+              <a:gd name="connsiteX3" fmla="*/ 1386493 w 1876074"/>
+              <a:gd name="connsiteY3" fmla="*/ 36910 h 1161400"/>
+              <a:gd name="connsiteX4" fmla="*/ 1876074 w 1876074"/>
+              <a:gd name="connsiteY4" fmla="*/ 378465 h 1161400"/>
+              <a:gd name="connsiteX5" fmla="*/ 1515694 w 1876074"/>
+              <a:gd name="connsiteY5" fmla="*/ 745034 h 1161400"/>
+              <a:gd name="connsiteX6" fmla="*/ 1471902 w 1876074"/>
+              <a:gd name="connsiteY6" fmla="*/ 740739 h 1161400"/>
+              <a:gd name="connsiteX7" fmla="*/ 1458864 w 1876074"/>
+              <a:gd name="connsiteY7" fmla="*/ 709845 h 1161400"/>
+              <a:gd name="connsiteX8" fmla="*/ 1403466 w 1876074"/>
+              <a:gd name="connsiteY8" fmla="*/ 680330 h 1161400"/>
+              <a:gd name="connsiteX9" fmla="*/ 1224101 w 1876074"/>
+              <a:gd name="connsiteY9" fmla="*/ 577805 h 1161400"/>
+              <a:gd name="connsiteX10" fmla="*/ 366605 w 1876074"/>
+              <a:gd name="connsiteY10" fmla="*/ 1161369 h 1161400"/>
+              <a:gd name="connsiteX11" fmla="*/ 280388 w 1876074"/>
+              <a:gd name="connsiteY11" fmla="*/ 1111375 h 1161400"/>
+              <a:gd name="connsiteX12" fmla="*/ 0 w 1876074"/>
+              <a:gd name="connsiteY12" fmla="*/ 828460 h 1161400"/>
+              <a:gd name="connsiteX0" fmla="*/ 0 w 1889398"/>
+              <a:gd name="connsiteY0" fmla="*/ 828460 h 1161400"/>
+              <a:gd name="connsiteX1" fmla="*/ 264208 w 1889398"/>
+              <a:gd name="connsiteY1" fmla="*/ 459161 h 1161400"/>
+              <a:gd name="connsiteX2" fmla="*/ 1089308 w 1889398"/>
+              <a:gd name="connsiteY2" fmla="*/ 13082 h 1161400"/>
+              <a:gd name="connsiteX3" fmla="*/ 1386493 w 1889398"/>
+              <a:gd name="connsiteY3" fmla="*/ 36910 h 1161400"/>
+              <a:gd name="connsiteX4" fmla="*/ 1889398 w 1889398"/>
+              <a:gd name="connsiteY4" fmla="*/ 385486 h 1161400"/>
+              <a:gd name="connsiteX5" fmla="*/ 1515694 w 1889398"/>
+              <a:gd name="connsiteY5" fmla="*/ 745034 h 1161400"/>
+              <a:gd name="connsiteX6" fmla="*/ 1471902 w 1889398"/>
+              <a:gd name="connsiteY6" fmla="*/ 740739 h 1161400"/>
+              <a:gd name="connsiteX7" fmla="*/ 1458864 w 1889398"/>
+              <a:gd name="connsiteY7" fmla="*/ 709845 h 1161400"/>
+              <a:gd name="connsiteX8" fmla="*/ 1403466 w 1889398"/>
+              <a:gd name="connsiteY8" fmla="*/ 680330 h 1161400"/>
+              <a:gd name="connsiteX9" fmla="*/ 1224101 w 1889398"/>
+              <a:gd name="connsiteY9" fmla="*/ 577805 h 1161400"/>
+              <a:gd name="connsiteX10" fmla="*/ 366605 w 1889398"/>
+              <a:gd name="connsiteY10" fmla="*/ 1161369 h 1161400"/>
+              <a:gd name="connsiteX11" fmla="*/ 280388 w 1889398"/>
+              <a:gd name="connsiteY11" fmla="*/ 1111375 h 1161400"/>
+              <a:gd name="connsiteX12" fmla="*/ 0 w 1889398"/>
+              <a:gd name="connsiteY12" fmla="*/ 828460 h 1161400"/>
+              <a:gd name="connsiteX0" fmla="*/ 0 w 1889398"/>
+              <a:gd name="connsiteY0" fmla="*/ 819390 h 1152330"/>
+              <a:gd name="connsiteX1" fmla="*/ 264208 w 1889398"/>
+              <a:gd name="connsiteY1" fmla="*/ 450091 h 1152330"/>
+              <a:gd name="connsiteX2" fmla="*/ 1089308 w 1889398"/>
+              <a:gd name="connsiteY2" fmla="*/ 4012 h 1152330"/>
+              <a:gd name="connsiteX3" fmla="*/ 1380543 w 1889398"/>
+              <a:gd name="connsiteY3" fmla="*/ 69817 h 1152330"/>
+              <a:gd name="connsiteX4" fmla="*/ 1889398 w 1889398"/>
+              <a:gd name="connsiteY4" fmla="*/ 376416 h 1152330"/>
+              <a:gd name="connsiteX5" fmla="*/ 1515694 w 1889398"/>
+              <a:gd name="connsiteY5" fmla="*/ 735964 h 1152330"/>
+              <a:gd name="connsiteX6" fmla="*/ 1471902 w 1889398"/>
+              <a:gd name="connsiteY6" fmla="*/ 731669 h 1152330"/>
+              <a:gd name="connsiteX7" fmla="*/ 1458864 w 1889398"/>
+              <a:gd name="connsiteY7" fmla="*/ 700775 h 1152330"/>
+              <a:gd name="connsiteX8" fmla="*/ 1403466 w 1889398"/>
+              <a:gd name="connsiteY8" fmla="*/ 671260 h 1152330"/>
+              <a:gd name="connsiteX9" fmla="*/ 1224101 w 1889398"/>
+              <a:gd name="connsiteY9" fmla="*/ 568735 h 1152330"/>
+              <a:gd name="connsiteX10" fmla="*/ 366605 w 1889398"/>
+              <a:gd name="connsiteY10" fmla="*/ 1152299 h 1152330"/>
+              <a:gd name="connsiteX11" fmla="*/ 280388 w 1889398"/>
+              <a:gd name="connsiteY11" fmla="*/ 1102305 h 1152330"/>
+              <a:gd name="connsiteX12" fmla="*/ 0 w 1889398"/>
+              <a:gd name="connsiteY12" fmla="*/ 819390 h 1152330"/>
+              <a:gd name="connsiteX0" fmla="*/ 0 w 1889398"/>
+              <a:gd name="connsiteY0" fmla="*/ 786566 h 1119506"/>
+              <a:gd name="connsiteX1" fmla="*/ 264208 w 1889398"/>
+              <a:gd name="connsiteY1" fmla="*/ 417267 h 1119506"/>
+              <a:gd name="connsiteX2" fmla="*/ 1076625 w 1889398"/>
+              <a:gd name="connsiteY2" fmla="*/ 13021 h 1119506"/>
+              <a:gd name="connsiteX3" fmla="*/ 1380543 w 1889398"/>
+              <a:gd name="connsiteY3" fmla="*/ 36993 h 1119506"/>
+              <a:gd name="connsiteX4" fmla="*/ 1889398 w 1889398"/>
+              <a:gd name="connsiteY4" fmla="*/ 343592 h 1119506"/>
+              <a:gd name="connsiteX5" fmla="*/ 1515694 w 1889398"/>
+              <a:gd name="connsiteY5" fmla="*/ 703140 h 1119506"/>
+              <a:gd name="connsiteX6" fmla="*/ 1471902 w 1889398"/>
+              <a:gd name="connsiteY6" fmla="*/ 698845 h 1119506"/>
+              <a:gd name="connsiteX7" fmla="*/ 1458864 w 1889398"/>
+              <a:gd name="connsiteY7" fmla="*/ 667951 h 1119506"/>
+              <a:gd name="connsiteX8" fmla="*/ 1403466 w 1889398"/>
+              <a:gd name="connsiteY8" fmla="*/ 638436 h 1119506"/>
+              <a:gd name="connsiteX9" fmla="*/ 1224101 w 1889398"/>
+              <a:gd name="connsiteY9" fmla="*/ 535911 h 1119506"/>
+              <a:gd name="connsiteX10" fmla="*/ 366605 w 1889398"/>
+              <a:gd name="connsiteY10" fmla="*/ 1119475 h 1119506"/>
+              <a:gd name="connsiteX11" fmla="*/ 280388 w 1889398"/>
+              <a:gd name="connsiteY11" fmla="*/ 1069481 h 1119506"/>
+              <a:gd name="connsiteX12" fmla="*/ 0 w 1889398"/>
+              <a:gd name="connsiteY12" fmla="*/ 786566 h 1119506"/>
+              <a:gd name="connsiteX0" fmla="*/ 0 w 1889398"/>
+              <a:gd name="connsiteY0" fmla="*/ 786566 h 1119506"/>
+              <a:gd name="connsiteX1" fmla="*/ 290493 w 1889398"/>
+              <a:gd name="connsiteY1" fmla="*/ 448144 h 1119506"/>
+              <a:gd name="connsiteX2" fmla="*/ 1076625 w 1889398"/>
+              <a:gd name="connsiteY2" fmla="*/ 13021 h 1119506"/>
+              <a:gd name="connsiteX3" fmla="*/ 1380543 w 1889398"/>
+              <a:gd name="connsiteY3" fmla="*/ 36993 h 1119506"/>
+              <a:gd name="connsiteX4" fmla="*/ 1889398 w 1889398"/>
+              <a:gd name="connsiteY4" fmla="*/ 343592 h 1119506"/>
+              <a:gd name="connsiteX5" fmla="*/ 1515694 w 1889398"/>
+              <a:gd name="connsiteY5" fmla="*/ 703140 h 1119506"/>
+              <a:gd name="connsiteX6" fmla="*/ 1471902 w 1889398"/>
+              <a:gd name="connsiteY6" fmla="*/ 698845 h 1119506"/>
+              <a:gd name="connsiteX7" fmla="*/ 1458864 w 1889398"/>
+              <a:gd name="connsiteY7" fmla="*/ 667951 h 1119506"/>
+              <a:gd name="connsiteX8" fmla="*/ 1403466 w 1889398"/>
+              <a:gd name="connsiteY8" fmla="*/ 638436 h 1119506"/>
+              <a:gd name="connsiteX9" fmla="*/ 1224101 w 1889398"/>
+              <a:gd name="connsiteY9" fmla="*/ 535911 h 1119506"/>
+              <a:gd name="connsiteX10" fmla="*/ 366605 w 1889398"/>
+              <a:gd name="connsiteY10" fmla="*/ 1119475 h 1119506"/>
+              <a:gd name="connsiteX11" fmla="*/ 280388 w 1889398"/>
+              <a:gd name="connsiteY11" fmla="*/ 1069481 h 1119506"/>
+              <a:gd name="connsiteX12" fmla="*/ 0 w 1889398"/>
+              <a:gd name="connsiteY12" fmla="*/ 786566 h 1119506"/>
+              <a:gd name="connsiteX0" fmla="*/ 0 w 1889398"/>
+              <a:gd name="connsiteY0" fmla="*/ 793152 h 1126092"/>
+              <a:gd name="connsiteX1" fmla="*/ 290493 w 1889398"/>
+              <a:gd name="connsiteY1" fmla="*/ 454730 h 1126092"/>
+              <a:gd name="connsiteX2" fmla="*/ 1066740 w 1889398"/>
+              <a:gd name="connsiteY2" fmla="*/ 9291 h 1126092"/>
+              <a:gd name="connsiteX3" fmla="*/ 1380543 w 1889398"/>
+              <a:gd name="connsiteY3" fmla="*/ 43579 h 1126092"/>
+              <a:gd name="connsiteX4" fmla="*/ 1889398 w 1889398"/>
+              <a:gd name="connsiteY4" fmla="*/ 350178 h 1126092"/>
+              <a:gd name="connsiteX5" fmla="*/ 1515694 w 1889398"/>
+              <a:gd name="connsiteY5" fmla="*/ 709726 h 1126092"/>
+              <a:gd name="connsiteX6" fmla="*/ 1471902 w 1889398"/>
+              <a:gd name="connsiteY6" fmla="*/ 705431 h 1126092"/>
+              <a:gd name="connsiteX7" fmla="*/ 1458864 w 1889398"/>
+              <a:gd name="connsiteY7" fmla="*/ 674537 h 1126092"/>
+              <a:gd name="connsiteX8" fmla="*/ 1403466 w 1889398"/>
+              <a:gd name="connsiteY8" fmla="*/ 645022 h 1126092"/>
+              <a:gd name="connsiteX9" fmla="*/ 1224101 w 1889398"/>
+              <a:gd name="connsiteY9" fmla="*/ 542497 h 1126092"/>
+              <a:gd name="connsiteX10" fmla="*/ 366605 w 1889398"/>
+              <a:gd name="connsiteY10" fmla="*/ 1126061 h 1126092"/>
+              <a:gd name="connsiteX11" fmla="*/ 280388 w 1889398"/>
+              <a:gd name="connsiteY11" fmla="*/ 1076067 h 1126092"/>
+              <a:gd name="connsiteX12" fmla="*/ 0 w 1889398"/>
+              <a:gd name="connsiteY12" fmla="*/ 793152 h 1126092"/>
+              <a:gd name="connsiteX0" fmla="*/ 0 w 1889398"/>
+              <a:gd name="connsiteY0" fmla="*/ 793152 h 1126092"/>
+              <a:gd name="connsiteX1" fmla="*/ 290493 w 1889398"/>
+              <a:gd name="connsiteY1" fmla="*/ 454730 h 1126092"/>
+              <a:gd name="connsiteX2" fmla="*/ 1066740 w 1889398"/>
+              <a:gd name="connsiteY2" fmla="*/ 9291 h 1126092"/>
+              <a:gd name="connsiteX3" fmla="*/ 1380543 w 1889398"/>
+              <a:gd name="connsiteY3" fmla="*/ 43579 h 1126092"/>
+              <a:gd name="connsiteX4" fmla="*/ 1889398 w 1889398"/>
+              <a:gd name="connsiteY4" fmla="*/ 350178 h 1126092"/>
+              <a:gd name="connsiteX5" fmla="*/ 1515694 w 1889398"/>
+              <a:gd name="connsiteY5" fmla="*/ 709726 h 1126092"/>
+              <a:gd name="connsiteX6" fmla="*/ 1471902 w 1889398"/>
+              <a:gd name="connsiteY6" fmla="*/ 705431 h 1126092"/>
+              <a:gd name="connsiteX7" fmla="*/ 1458864 w 1889398"/>
+              <a:gd name="connsiteY7" fmla="*/ 674537 h 1126092"/>
+              <a:gd name="connsiteX8" fmla="*/ 1403466 w 1889398"/>
+              <a:gd name="connsiteY8" fmla="*/ 645022 h 1126092"/>
+              <a:gd name="connsiteX9" fmla="*/ 1224101 w 1889398"/>
+              <a:gd name="connsiteY9" fmla="*/ 542497 h 1126092"/>
+              <a:gd name="connsiteX10" fmla="*/ 366605 w 1889398"/>
+              <a:gd name="connsiteY10" fmla="*/ 1126061 h 1126092"/>
+              <a:gd name="connsiteX11" fmla="*/ 280388 w 1889398"/>
+              <a:gd name="connsiteY11" fmla="*/ 1076067 h 1126092"/>
+              <a:gd name="connsiteX12" fmla="*/ 0 w 1889398"/>
+              <a:gd name="connsiteY12" fmla="*/ 793152 h 1126092"/>
+              <a:gd name="connsiteX0" fmla="*/ 0 w 1889398"/>
+              <a:gd name="connsiteY0" fmla="*/ 793152 h 1126092"/>
+              <a:gd name="connsiteX1" fmla="*/ 290493 w 1889398"/>
+              <a:gd name="connsiteY1" fmla="*/ 454730 h 1126092"/>
+              <a:gd name="connsiteX2" fmla="*/ 1066740 w 1889398"/>
+              <a:gd name="connsiteY2" fmla="*/ 9291 h 1126092"/>
+              <a:gd name="connsiteX3" fmla="*/ 1380543 w 1889398"/>
+              <a:gd name="connsiteY3" fmla="*/ 43579 h 1126092"/>
+              <a:gd name="connsiteX4" fmla="*/ 1889398 w 1889398"/>
+              <a:gd name="connsiteY4" fmla="*/ 350178 h 1126092"/>
+              <a:gd name="connsiteX5" fmla="*/ 1515694 w 1889398"/>
+              <a:gd name="connsiteY5" fmla="*/ 709726 h 1126092"/>
+              <a:gd name="connsiteX6" fmla="*/ 1471902 w 1889398"/>
+              <a:gd name="connsiteY6" fmla="*/ 705431 h 1126092"/>
+              <a:gd name="connsiteX7" fmla="*/ 1458864 w 1889398"/>
+              <a:gd name="connsiteY7" fmla="*/ 674537 h 1126092"/>
+              <a:gd name="connsiteX8" fmla="*/ 1403466 w 1889398"/>
+              <a:gd name="connsiteY8" fmla="*/ 645022 h 1126092"/>
+              <a:gd name="connsiteX9" fmla="*/ 1224101 w 1889398"/>
+              <a:gd name="connsiteY9" fmla="*/ 542497 h 1126092"/>
+              <a:gd name="connsiteX10" fmla="*/ 366605 w 1889398"/>
+              <a:gd name="connsiteY10" fmla="*/ 1126061 h 1126092"/>
+              <a:gd name="connsiteX11" fmla="*/ 280388 w 1889398"/>
+              <a:gd name="connsiteY11" fmla="*/ 1076067 h 1126092"/>
+              <a:gd name="connsiteX12" fmla="*/ 0 w 1889398"/>
+              <a:gd name="connsiteY12" fmla="*/ 793152 h 1126092"/>
+              <a:gd name="connsiteX0" fmla="*/ 0 w 1889398"/>
+              <a:gd name="connsiteY0" fmla="*/ 793152 h 1126092"/>
+              <a:gd name="connsiteX1" fmla="*/ 290493 w 1889398"/>
+              <a:gd name="connsiteY1" fmla="*/ 454730 h 1126092"/>
+              <a:gd name="connsiteX2" fmla="*/ 1066740 w 1889398"/>
+              <a:gd name="connsiteY2" fmla="*/ 9291 h 1126092"/>
+              <a:gd name="connsiteX3" fmla="*/ 1380543 w 1889398"/>
+              <a:gd name="connsiteY3" fmla="*/ 43579 h 1126092"/>
+              <a:gd name="connsiteX4" fmla="*/ 1889398 w 1889398"/>
+              <a:gd name="connsiteY4" fmla="*/ 350178 h 1126092"/>
+              <a:gd name="connsiteX5" fmla="*/ 1515694 w 1889398"/>
+              <a:gd name="connsiteY5" fmla="*/ 709726 h 1126092"/>
+              <a:gd name="connsiteX6" fmla="*/ 1471902 w 1889398"/>
+              <a:gd name="connsiteY6" fmla="*/ 705431 h 1126092"/>
+              <a:gd name="connsiteX7" fmla="*/ 1458864 w 1889398"/>
+              <a:gd name="connsiteY7" fmla="*/ 674537 h 1126092"/>
+              <a:gd name="connsiteX8" fmla="*/ 1403466 w 1889398"/>
+              <a:gd name="connsiteY8" fmla="*/ 645022 h 1126092"/>
+              <a:gd name="connsiteX9" fmla="*/ 1224101 w 1889398"/>
+              <a:gd name="connsiteY9" fmla="*/ 542497 h 1126092"/>
+              <a:gd name="connsiteX10" fmla="*/ 366605 w 1889398"/>
+              <a:gd name="connsiteY10" fmla="*/ 1126061 h 1126092"/>
+              <a:gd name="connsiteX11" fmla="*/ 280388 w 1889398"/>
+              <a:gd name="connsiteY11" fmla="*/ 1076067 h 1126092"/>
+              <a:gd name="connsiteX12" fmla="*/ 0 w 1889398"/>
+              <a:gd name="connsiteY12" fmla="*/ 793152 h 1126092"/>
+              <a:gd name="connsiteX0" fmla="*/ 0 w 1889398"/>
+              <a:gd name="connsiteY0" fmla="*/ 793152 h 1126092"/>
+              <a:gd name="connsiteX1" fmla="*/ 290493 w 1889398"/>
+              <a:gd name="connsiteY1" fmla="*/ 454730 h 1126092"/>
+              <a:gd name="connsiteX2" fmla="*/ 1066740 w 1889398"/>
+              <a:gd name="connsiteY2" fmla="*/ 9291 h 1126092"/>
+              <a:gd name="connsiteX3" fmla="*/ 1380543 w 1889398"/>
+              <a:gd name="connsiteY3" fmla="*/ 43579 h 1126092"/>
+              <a:gd name="connsiteX4" fmla="*/ 1889398 w 1889398"/>
+              <a:gd name="connsiteY4" fmla="*/ 350178 h 1126092"/>
+              <a:gd name="connsiteX5" fmla="*/ 1515694 w 1889398"/>
+              <a:gd name="connsiteY5" fmla="*/ 709726 h 1126092"/>
+              <a:gd name="connsiteX6" fmla="*/ 1471902 w 1889398"/>
+              <a:gd name="connsiteY6" fmla="*/ 705431 h 1126092"/>
+              <a:gd name="connsiteX7" fmla="*/ 1458864 w 1889398"/>
+              <a:gd name="connsiteY7" fmla="*/ 674537 h 1126092"/>
+              <a:gd name="connsiteX8" fmla="*/ 1403466 w 1889398"/>
+              <a:gd name="connsiteY8" fmla="*/ 645022 h 1126092"/>
+              <a:gd name="connsiteX9" fmla="*/ 1224101 w 1889398"/>
+              <a:gd name="connsiteY9" fmla="*/ 542497 h 1126092"/>
+              <a:gd name="connsiteX10" fmla="*/ 366605 w 1889398"/>
+              <a:gd name="connsiteY10" fmla="*/ 1126061 h 1126092"/>
+              <a:gd name="connsiteX11" fmla="*/ 280388 w 1889398"/>
+              <a:gd name="connsiteY11" fmla="*/ 1076067 h 1126092"/>
+              <a:gd name="connsiteX12" fmla="*/ 0 w 1889398"/>
+              <a:gd name="connsiteY12" fmla="*/ 793152 h 1126092"/>
+            </a:gdLst>
+            <a:ahLst/>
+            <a:cxnLst>
+              <a:cxn ang="0">
+                <a:pos x="connsiteX0" y="connsiteY0"/>
+              </a:cxn>
+              <a:cxn ang="0">
+                <a:pos x="connsiteX1" y="connsiteY1"/>
+              </a:cxn>
+              <a:cxn ang="0">
+                <a:pos x="connsiteX2" y="connsiteY2"/>
+              </a:cxn>
+              <a:cxn ang="0">
+                <a:pos x="connsiteX3" y="connsiteY3"/>
+              </a:cxn>
+              <a:cxn ang="0">
+                <a:pos x="connsiteX4" y="connsiteY4"/>
+              </a:cxn>
+              <a:cxn ang="0">
+                <a:pos x="connsiteX5" y="connsiteY5"/>
+              </a:cxn>
+              <a:cxn ang="0">
+                <a:pos x="connsiteX6" y="connsiteY6"/>
+              </a:cxn>
+              <a:cxn ang="0">
+                <a:pos x="connsiteX7" y="connsiteY7"/>
+              </a:cxn>
+              <a:cxn ang="0">
+                <a:pos x="connsiteX8" y="connsiteY8"/>
+              </a:cxn>
+              <a:cxn ang="0">
+                <a:pos x="connsiteX9" y="connsiteY9"/>
+              </a:cxn>
+              <a:cxn ang="0">
+                <a:pos x="connsiteX10" y="connsiteY10"/>
+              </a:cxn>
+              <a:cxn ang="0">
+                <a:pos x="connsiteX11" y="connsiteY11"/>
+              </a:cxn>
+              <a:cxn ang="0">
+                <a:pos x="connsiteX12" y="connsiteY12"/>
+              </a:cxn>
+            </a:cxnLst>
+            <a:rect l="l" t="t" r="r" b="b"/>
+            <a:pathLst>
+              <a:path w="1889398" h="1126092">
+                <a:moveTo>
+                  <a:pt x="0" y="793152"/>
+                </a:moveTo>
+                <a:cubicBezTo>
+                  <a:pt x="0" y="740125"/>
+                  <a:pt x="205294" y="541619"/>
+                  <a:pt x="290493" y="454730"/>
+                </a:cubicBezTo>
+                <a:cubicBezTo>
+                  <a:pt x="467525" y="325361"/>
+                  <a:pt x="791907" y="26367"/>
+                  <a:pt x="1066740" y="9291"/>
+                </a:cubicBezTo>
+                <a:cubicBezTo>
+                  <a:pt x="1260698" y="-6144"/>
+                  <a:pt x="1310275" y="-7036"/>
+                  <a:pt x="1380543" y="43579"/>
+                </a:cubicBezTo>
+                <a:cubicBezTo>
+                  <a:pt x="1433570" y="43579"/>
+                  <a:pt x="1889398" y="297151"/>
+                  <a:pt x="1889398" y="350178"/>
+                </a:cubicBezTo>
+                <a:lnTo>
+                  <a:pt x="1515694" y="709726"/>
+                </a:lnTo>
+                <a:cubicBezTo>
+                  <a:pt x="1450386" y="765938"/>
+                  <a:pt x="1481374" y="711296"/>
+                  <a:pt x="1471902" y="705431"/>
+                </a:cubicBezTo>
+                <a:cubicBezTo>
+                  <a:pt x="1462430" y="699566"/>
+                  <a:pt x="1472324" y="680439"/>
+                  <a:pt x="1458864" y="674537"/>
+                </a:cubicBezTo>
+                <a:cubicBezTo>
+                  <a:pt x="1414871" y="675451"/>
+                  <a:pt x="1441352" y="659423"/>
+                  <a:pt x="1403466" y="645022"/>
+                </a:cubicBezTo>
+                <a:cubicBezTo>
+                  <a:pt x="1365580" y="630621"/>
+                  <a:pt x="1411033" y="613248"/>
+                  <a:pt x="1224101" y="542497"/>
+                </a:cubicBezTo>
+                <a:cubicBezTo>
+                  <a:pt x="940235" y="372772"/>
+                  <a:pt x="537532" y="1123879"/>
+                  <a:pt x="366605" y="1126061"/>
+                </a:cubicBezTo>
+                <a:cubicBezTo>
+                  <a:pt x="313578" y="1126061"/>
+                  <a:pt x="280388" y="1129094"/>
+                  <a:pt x="280388" y="1076067"/>
+                </a:cubicBezTo>
+                <a:lnTo>
+                  <a:pt x="0" y="793152"/>
+                </a:lnTo>
+                <a:close/>
+              </a:path>
+            </a:pathLst>
+          </a:custGeom>
+          <a:solidFill>
+            <a:schemeClr val="accent3">
+              <a:lumMod val="50000"/>
+              <a:alpha val="30000"/>
+            </a:schemeClr>
+          </a:solidFill>
+          <a:ln>
+            <a:solidFill>
+              <a:schemeClr val="accent3">
+                <a:lumMod val="75000"/>
+              </a:schemeClr>
+            </a:solidFill>
+          </a:ln>
+        </p:spPr>
+        <p:style>
+          <a:lnRef idx="2">
+            <a:schemeClr val="accent1">
+              <a:shade val="50000"/>
+            </a:schemeClr>
+          </a:lnRef>
+          <a:fillRef idx="1">
+            <a:schemeClr val="accent1"/>
+          </a:fillRef>
+          <a:effectRef idx="0">
+            <a:schemeClr val="accent1"/>
+          </a:effectRef>
+          <a:fontRef idx="minor">
+            <a:schemeClr val="lt1"/>
+          </a:fontRef>
+        </p:style>
+        <p:txBody>
+          <a:bodyPr rtlCol="0" anchor="ctr"/>
+          <a:lstStyle/>
+          <a:p>
+            <a:pPr algn="ctr"/>
+            <a:endParaRPr kumimoji="1" lang="ja-JP" altLang="en-US"/>
+          </a:p>
+        </p:txBody>
+      </p:sp>
+      <p:sp>
+        <p:nvSpPr>
+          <p:cNvPr id="8" name="角丸四角形 7"/>
+          <p:cNvSpPr/>
+          <p:nvPr/>
+        </p:nvSpPr>
+        <p:spPr>
+          <a:xfrm>
+            <a:off x="568152" y="2280320"/>
+            <a:ext cx="792088" cy="360040"/>
+          </a:xfrm>
+          <a:prstGeom prst="roundRect">
+            <a:avLst/>
+          </a:prstGeom>
+        </p:spPr>
+        <p:style>
+          <a:lnRef idx="2">
+            <a:schemeClr val="accent1">
+              <a:shade val="50000"/>
+            </a:schemeClr>
+          </a:lnRef>
+          <a:fillRef idx="1">
+            <a:schemeClr val="accent1"/>
+          </a:fillRef>
+          <a:effectRef idx="0">
+            <a:schemeClr val="accent1"/>
+          </a:effectRef>
+          <a:fontRef idx="minor">
+            <a:schemeClr val="lt1"/>
+          </a:fontRef>
+        </p:style>
+        <p:txBody>
+          <a:bodyPr rtlCol="0" anchor="ctr"/>
+          <a:lstStyle/>
+          <a:p>
+            <a:pPr algn="ctr"/>
+            <a:endParaRPr kumimoji="1" lang="ja-JP" altLang="en-US"/>
+          </a:p>
+        </p:txBody>
+      </p:sp>
+      <p:grpSp>
+        <p:nvGrpSpPr>
+          <p:cNvPr id="100" name="グループ化 99"/>
+          <p:cNvGrpSpPr/>
+          <p:nvPr/>
+        </p:nvGrpSpPr>
+        <p:grpSpPr>
+          <a:xfrm>
+            <a:off x="3024705" y="4966114"/>
+            <a:ext cx="4412379" cy="3034158"/>
+            <a:chOff x="4856320" y="5016624"/>
+            <a:chExt cx="4412379" cy="3034158"/>
+          </a:xfrm>
+        </p:grpSpPr>
+        <p:pic>
+          <p:nvPicPr>
+            <p:cNvPr id="9" name="Picture 2"/>
+            <p:cNvPicPr>
+              <a:picLocks noChangeAspect="1" noChangeArrowheads="1"/>
+            </p:cNvPicPr>
+            <p:nvPr/>
+          </p:nvPicPr>
+          <p:blipFill rotWithShape="1">
+            <a:blip r:embed="rId2" cstate="print">
+              <a:extLst>
+                <a:ext uri="{28A0092B-C50C-407E-A947-70E740481C1C}">
+                  <a14:useLocalDpi xmlns:a14="http://schemas.microsoft.com/office/drawing/2010/main" val="0"/>
+                </a:ext>
+              </a:extLst>
+            </a:blip>
+            <a:srcRect l="218" r="1089"/>
+            <a:stretch/>
+          </p:blipFill>
+          <p:spPr bwMode="auto">
+            <a:xfrm>
+              <a:off x="4856320" y="5016624"/>
+              <a:ext cx="4412379" cy="3034158"/>
+            </a:xfrm>
+            <a:prstGeom prst="rect">
+              <a:avLst/>
+            </a:prstGeom>
+            <a:noFill/>
+            <a:ln w="9525">
+              <a:noFill/>
+              <a:miter lim="800000"/>
+              <a:headEnd/>
+              <a:tailEnd/>
+            </a:ln>
+            <a:effectLst/>
+            <a:extLst>
+              <a:ext uri="{909E8E84-426E-40DD-AFC4-6F175D3DCCD1}">
+                <a14:hiddenFill xmlns:a14="http://schemas.microsoft.com/office/drawing/2010/main">
+                  <a:solidFill>
+                    <a:schemeClr val="accent1"/>
+                  </a:solidFill>
+                </a14:hiddenFill>
+              </a:ext>
+              <a:ext uri="{AF507438-7753-43E0-B8FC-AC1667EBCBE1}">
+                <a14:hiddenEffects xmlns:a14="http://schemas.microsoft.com/office/drawing/2010/main">
+                  <a:effectLst>
+                    <a:outerShdw dist="35921" dir="2700000" algn="ctr" rotWithShape="0">
+                      <a:schemeClr val="bg2"/>
+                    </a:outerShdw>
+                  </a:effectLst>
+                </a14:hiddenEffects>
+              </a:ext>
+            </a:extLst>
+          </p:spPr>
+        </p:pic>
+        <p:sp>
+          <p:nvSpPr>
+            <p:cNvPr id="25" name="フリーフォーム 24"/>
+            <p:cNvSpPr/>
+            <p:nvPr/>
+          </p:nvSpPr>
+          <p:spPr>
+            <a:xfrm>
+              <a:off x="5127625" y="5321300"/>
+              <a:ext cx="4038600" cy="2384425"/>
+            </a:xfrm>
+            <a:custGeom>
+              <a:avLst/>
+              <a:gdLst>
+                <a:gd name="connsiteX0" fmla="*/ 4038600 w 4038600"/>
+                <a:gd name="connsiteY0" fmla="*/ 9525 h 2384425"/>
+                <a:gd name="connsiteX1" fmla="*/ 539750 w 4038600"/>
+                <a:gd name="connsiteY1" fmla="*/ 0 h 2384425"/>
+                <a:gd name="connsiteX2" fmla="*/ 263525 w 4038600"/>
+                <a:gd name="connsiteY2" fmla="*/ 38100 h 2384425"/>
+                <a:gd name="connsiteX3" fmla="*/ 95250 w 4038600"/>
+                <a:gd name="connsiteY3" fmla="*/ 161925 h 2384425"/>
+                <a:gd name="connsiteX4" fmla="*/ 12700 w 4038600"/>
+                <a:gd name="connsiteY4" fmla="*/ 346075 h 2384425"/>
+                <a:gd name="connsiteX5" fmla="*/ 3175 w 4038600"/>
+                <a:gd name="connsiteY5" fmla="*/ 539750 h 2384425"/>
+                <a:gd name="connsiteX6" fmla="*/ 0 w 4038600"/>
+                <a:gd name="connsiteY6" fmla="*/ 2000250 h 2384425"/>
+                <a:gd name="connsiteX7" fmla="*/ 82550 w 4038600"/>
+                <a:gd name="connsiteY7" fmla="*/ 2178050 h 2384425"/>
+                <a:gd name="connsiteX8" fmla="*/ 250825 w 4038600"/>
+                <a:gd name="connsiteY8" fmla="*/ 2324100 h 2384425"/>
+                <a:gd name="connsiteX9" fmla="*/ 396875 w 4038600"/>
+                <a:gd name="connsiteY9" fmla="*/ 2371725 h 2384425"/>
+                <a:gd name="connsiteX10" fmla="*/ 612775 w 4038600"/>
+                <a:gd name="connsiteY10" fmla="*/ 2381250 h 2384425"/>
+                <a:gd name="connsiteX11" fmla="*/ 803275 w 4038600"/>
+                <a:gd name="connsiteY11" fmla="*/ 2241550 h 2384425"/>
+                <a:gd name="connsiteX12" fmla="*/ 869950 w 4038600"/>
+                <a:gd name="connsiteY12" fmla="*/ 2041525 h 2384425"/>
+                <a:gd name="connsiteX13" fmla="*/ 857250 w 4038600"/>
+                <a:gd name="connsiteY13" fmla="*/ 1898650 h 2384425"/>
+                <a:gd name="connsiteX14" fmla="*/ 752475 w 4038600"/>
+                <a:gd name="connsiteY14" fmla="*/ 1673225 h 2384425"/>
+                <a:gd name="connsiteX15" fmla="*/ 466725 w 4038600"/>
+                <a:gd name="connsiteY15" fmla="*/ 1200150 h 2384425"/>
+                <a:gd name="connsiteX16" fmla="*/ 419100 w 4038600"/>
+                <a:gd name="connsiteY16" fmla="*/ 981075 h 2384425"/>
+                <a:gd name="connsiteX17" fmla="*/ 438150 w 4038600"/>
+                <a:gd name="connsiteY17" fmla="*/ 781050 h 2384425"/>
+                <a:gd name="connsiteX18" fmla="*/ 558800 w 4038600"/>
+                <a:gd name="connsiteY18" fmla="*/ 676275 h 2384425"/>
+                <a:gd name="connsiteX19" fmla="*/ 711200 w 4038600"/>
+                <a:gd name="connsiteY19" fmla="*/ 612775 h 2384425"/>
+                <a:gd name="connsiteX20" fmla="*/ 885825 w 4038600"/>
+                <a:gd name="connsiteY20" fmla="*/ 622300 h 2384425"/>
+                <a:gd name="connsiteX21" fmla="*/ 1012825 w 4038600"/>
+                <a:gd name="connsiteY21" fmla="*/ 695325 h 2384425"/>
+                <a:gd name="connsiteX22" fmla="*/ 1085850 w 4038600"/>
+                <a:gd name="connsiteY22" fmla="*/ 873125 h 2384425"/>
+                <a:gd name="connsiteX23" fmla="*/ 1101725 w 4038600"/>
+                <a:gd name="connsiteY23" fmla="*/ 911225 h 2384425"/>
+                <a:gd name="connsiteX24" fmla="*/ 1149350 w 4038600"/>
+                <a:gd name="connsiteY24" fmla="*/ 1054100 h 2384425"/>
+                <a:gd name="connsiteX25" fmla="*/ 1196975 w 4038600"/>
+                <a:gd name="connsiteY25" fmla="*/ 1292225 h 2384425"/>
+                <a:gd name="connsiteX26" fmla="*/ 1247775 w 4038600"/>
+                <a:gd name="connsiteY26" fmla="*/ 1663700 h 2384425"/>
+                <a:gd name="connsiteX27" fmla="*/ 1295400 w 4038600"/>
+                <a:gd name="connsiteY27" fmla="*/ 1968500 h 2384425"/>
+                <a:gd name="connsiteX28" fmla="*/ 1409700 w 4038600"/>
+                <a:gd name="connsiteY28" fmla="*/ 2193925 h 2384425"/>
+                <a:gd name="connsiteX29" fmla="*/ 1514475 w 4038600"/>
+                <a:gd name="connsiteY29" fmla="*/ 2295525 h 2384425"/>
+                <a:gd name="connsiteX30" fmla="*/ 1660525 w 4038600"/>
+                <a:gd name="connsiteY30" fmla="*/ 2371725 h 2384425"/>
+                <a:gd name="connsiteX31" fmla="*/ 1851025 w 4038600"/>
+                <a:gd name="connsiteY31" fmla="*/ 2384425 h 2384425"/>
+                <a:gd name="connsiteX32" fmla="*/ 2070100 w 4038600"/>
+                <a:gd name="connsiteY32" fmla="*/ 2384425 h 2384425"/>
+              </a:gdLst>
+              <a:ahLst/>
+              <a:cxnLst>
+                <a:cxn ang="0">
+                  <a:pos x="connsiteX0" y="connsiteY0"/>
+                </a:cxn>
+                <a:cxn ang="0">
+                  <a:pos x="connsiteX1" y="connsiteY1"/>
+                </a:cxn>
+                <a:cxn ang="0">
+                  <a:pos x="connsiteX2" y="connsiteY2"/>
+                </a:cxn>
+                <a:cxn ang="0">
+                  <a:pos x="connsiteX3" y="connsiteY3"/>
+                </a:cxn>
+                <a:cxn ang="0">
+                  <a:pos x="connsiteX4" y="connsiteY4"/>
+                </a:cxn>
+                <a:cxn ang="0">
+                  <a:pos x="connsiteX5" y="connsiteY5"/>
+                </a:cxn>
+                <a:cxn ang="0">
+                  <a:pos x="connsiteX6" y="connsiteY6"/>
+                </a:cxn>
+                <a:cxn ang="0">
+                  <a:pos x="connsiteX7" y="connsiteY7"/>
+                </a:cxn>
+                <a:cxn ang="0">
+                  <a:pos x="connsiteX8" y="connsiteY8"/>
+                </a:cxn>
+                <a:cxn ang="0">
+                  <a:pos x="connsiteX9" y="connsiteY9"/>
+                </a:cxn>
+                <a:cxn ang="0">
+                  <a:pos x="connsiteX10" y="connsiteY10"/>
+                </a:cxn>
+                <a:cxn ang="0">
+                  <a:pos x="connsiteX11" y="connsiteY11"/>
+                </a:cxn>
+                <a:cxn ang="0">
+                  <a:pos x="connsiteX12" y="connsiteY12"/>
+                </a:cxn>
+                <a:cxn ang="0">
+                  <a:pos x="connsiteX13" y="connsiteY13"/>
+                </a:cxn>
+                <a:cxn ang="0">
+                  <a:pos x="connsiteX14" y="connsiteY14"/>
+                </a:cxn>
+                <a:cxn ang="0">
+                  <a:pos x="connsiteX15" y="connsiteY15"/>
+                </a:cxn>
+                <a:cxn ang="0">
+                  <a:pos x="connsiteX16" y="connsiteY16"/>
+                </a:cxn>
+                <a:cxn ang="0">
+                  <a:pos x="connsiteX17" y="connsiteY17"/>
+                </a:cxn>
+                <a:cxn ang="0">
+                  <a:pos x="connsiteX18" y="connsiteY18"/>
+                </a:cxn>
+                <a:cxn ang="0">
+                  <a:pos x="connsiteX19" y="connsiteY19"/>
+                </a:cxn>
+                <a:cxn ang="0">
+                  <a:pos x="connsiteX20" y="connsiteY20"/>
+                </a:cxn>
+                <a:cxn ang="0">
+                  <a:pos x="connsiteX21" y="connsiteY21"/>
+                </a:cxn>
+                <a:cxn ang="0">
+                  <a:pos x="connsiteX22" y="connsiteY22"/>
+                </a:cxn>
+                <a:cxn ang="0">
+                  <a:pos x="connsiteX23" y="connsiteY23"/>
+                </a:cxn>
+                <a:cxn ang="0">
+                  <a:pos x="connsiteX24" y="connsiteY24"/>
+                </a:cxn>
+                <a:cxn ang="0">
+                  <a:pos x="connsiteX25" y="connsiteY25"/>
+                </a:cxn>
+                <a:cxn ang="0">
+                  <a:pos x="connsiteX26" y="connsiteY26"/>
+                </a:cxn>
+                <a:cxn ang="0">
+                  <a:pos x="connsiteX27" y="connsiteY27"/>
+                </a:cxn>
+                <a:cxn ang="0">
+                  <a:pos x="connsiteX28" y="connsiteY28"/>
+                </a:cxn>
+                <a:cxn ang="0">
+                  <a:pos x="connsiteX29" y="connsiteY29"/>
+                </a:cxn>
+                <a:cxn ang="0">
+                  <a:pos x="connsiteX30" y="connsiteY30"/>
+                </a:cxn>
+                <a:cxn ang="0">
+                  <a:pos x="connsiteX31" y="connsiteY31"/>
+                </a:cxn>
+                <a:cxn ang="0">
+                  <a:pos x="connsiteX32" y="connsiteY32"/>
+                </a:cxn>
+              </a:cxnLst>
+              <a:rect l="l" t="t" r="r" b="b"/>
+              <a:pathLst>
+                <a:path w="4038600" h="2384425">
+                  <a:moveTo>
+                    <a:pt x="4038600" y="9525"/>
+                  </a:moveTo>
+                  <a:lnTo>
+                    <a:pt x="539750" y="0"/>
+                  </a:lnTo>
+                  <a:lnTo>
+                    <a:pt x="263525" y="38100"/>
+                  </a:lnTo>
+                  <a:lnTo>
+                    <a:pt x="95250" y="161925"/>
+                  </a:lnTo>
+                  <a:lnTo>
+                    <a:pt x="12700" y="346075"/>
+                  </a:lnTo>
+                  <a:lnTo>
+                    <a:pt x="3175" y="539750"/>
+                  </a:lnTo>
+                  <a:cubicBezTo>
+                    <a:pt x="2117" y="1026583"/>
+                    <a:pt x="1058" y="1513417"/>
+                    <a:pt x="0" y="2000250"/>
+                  </a:cubicBezTo>
+                  <a:lnTo>
+                    <a:pt x="82550" y="2178050"/>
+                  </a:lnTo>
+                  <a:lnTo>
+                    <a:pt x="250825" y="2324100"/>
+                  </a:lnTo>
+                  <a:lnTo>
+                    <a:pt x="396875" y="2371725"/>
+                  </a:lnTo>
+                  <a:lnTo>
+                    <a:pt x="612775" y="2381250"/>
+                  </a:lnTo>
+                  <a:lnTo>
+                    <a:pt x="803275" y="2241550"/>
+                  </a:lnTo>
+                  <a:lnTo>
+                    <a:pt x="869950" y="2041525"/>
+                  </a:lnTo>
+                  <a:lnTo>
+                    <a:pt x="857250" y="1898650"/>
+                  </a:lnTo>
+                  <a:lnTo>
+                    <a:pt x="752475" y="1673225"/>
+                  </a:lnTo>
+                  <a:lnTo>
+                    <a:pt x="466725" y="1200150"/>
+                  </a:lnTo>
+                  <a:lnTo>
+                    <a:pt x="419100" y="981075"/>
+                  </a:lnTo>
+                  <a:lnTo>
+                    <a:pt x="438150" y="781050"/>
+                  </a:lnTo>
+                  <a:lnTo>
+                    <a:pt x="558800" y="676275"/>
+                  </a:lnTo>
+                  <a:lnTo>
+                    <a:pt x="711200" y="612775"/>
+                  </a:lnTo>
+                  <a:lnTo>
+                    <a:pt x="885825" y="622300"/>
+                  </a:lnTo>
+                  <a:lnTo>
+                    <a:pt x="1012825" y="695325"/>
+                  </a:lnTo>
+                  <a:lnTo>
+                    <a:pt x="1085850" y="873125"/>
+                  </a:lnTo>
+                  <a:lnTo>
+                    <a:pt x="1101725" y="911225"/>
+                  </a:lnTo>
+                  <a:lnTo>
+                    <a:pt x="1149350" y="1054100"/>
+                  </a:lnTo>
+                  <a:lnTo>
+                    <a:pt x="1196975" y="1292225"/>
+                  </a:lnTo>
+                  <a:lnTo>
+                    <a:pt x="1247775" y="1663700"/>
+                  </a:lnTo>
+                  <a:lnTo>
+                    <a:pt x="1295400" y="1968500"/>
+                  </a:lnTo>
+                  <a:lnTo>
+                    <a:pt x="1409700" y="2193925"/>
+                  </a:lnTo>
+                  <a:lnTo>
+                    <a:pt x="1514475" y="2295525"/>
+                  </a:lnTo>
+                  <a:lnTo>
+                    <a:pt x="1660525" y="2371725"/>
+                  </a:lnTo>
+                  <a:lnTo>
+                    <a:pt x="1851025" y="2384425"/>
+                  </a:lnTo>
+                  <a:lnTo>
+                    <a:pt x="2070100" y="2384425"/>
+                  </a:lnTo>
+                </a:path>
+              </a:pathLst>
+            </a:custGeom>
+            <a:ln w="41275">
+              <a:noFill/>
+            </a:ln>
+            <a:effectLst>
+              <a:glow rad="228600">
+                <a:schemeClr val="accent1">
+                  <a:satMod val="175000"/>
+                  <a:alpha val="38000"/>
+                </a:schemeClr>
+              </a:glow>
+              <a:softEdge rad="0"/>
+            </a:effectLst>
+          </p:spPr>
+          <p:style>
+            <a:lnRef idx="1">
+              <a:schemeClr val="accent1"/>
+            </a:lnRef>
+            <a:fillRef idx="0">
+              <a:schemeClr val="accent1"/>
+            </a:fillRef>
+            <a:effectRef idx="0">
+              <a:schemeClr val="accent1"/>
+            </a:effectRef>
+            <a:fontRef idx="minor">
+              <a:schemeClr val="tx1"/>
+            </a:fontRef>
+          </p:style>
+          <p:txBody>
+            <a:bodyPr rtlCol="0" anchor="ctr"/>
+            <a:lstStyle/>
+            <a:p>
+              <a:pPr algn="ctr"/>
+              <a:endParaRPr kumimoji="1" lang="ja-JP" altLang="en-US"/>
+            </a:p>
+          </p:txBody>
+        </p:sp>
+        <p:sp>
+          <p:nvSpPr>
+            <p:cNvPr id="20" name="テキスト ボックス 19"/>
+            <p:cNvSpPr txBox="1"/>
+            <p:nvPr/>
+          </p:nvSpPr>
+          <p:spPr>
+            <a:xfrm>
+              <a:off x="8633048" y="5136634"/>
+              <a:ext cx="432048" cy="369332"/>
+            </a:xfrm>
+            <a:prstGeom prst="rect">
+              <a:avLst/>
+            </a:prstGeom>
+            <a:noFill/>
+            <a:ln>
+              <a:noFill/>
+            </a:ln>
+          </p:spPr>
+          <p:txBody>
+            <a:bodyPr wrap="square" rtlCol="0">
+              <a:spAutoFit/>
+            </a:bodyPr>
+            <a:lstStyle/>
+            <a:p>
+              <a:r>
+                <a:rPr kumimoji="1" lang="ja-JP" altLang="en-US" sz="1800" dirty="0" smtClean="0">
+                  <a:solidFill>
+                    <a:srgbClr val="C00000"/>
+                  </a:solidFill>
+                </a:rPr>
+                <a:t>①</a:t>
+              </a:r>
+              <a:endParaRPr kumimoji="1" lang="ja-JP" altLang="en-US" sz="1800" dirty="0">
+                <a:solidFill>
+                  <a:srgbClr val="C00000"/>
+                </a:solidFill>
+              </a:endParaRPr>
+            </a:p>
+          </p:txBody>
+        </p:sp>
+        <p:sp>
+          <p:nvSpPr>
+            <p:cNvPr id="28" name="テキスト ボックス 27"/>
+            <p:cNvSpPr txBox="1"/>
+            <p:nvPr/>
+          </p:nvSpPr>
+          <p:spPr>
+            <a:xfrm>
+              <a:off x="7068647" y="5111456"/>
+              <a:ext cx="432048" cy="369332"/>
+            </a:xfrm>
+            <a:prstGeom prst="rect">
+              <a:avLst/>
+            </a:prstGeom>
+            <a:noFill/>
+            <a:ln>
+              <a:noFill/>
+            </a:ln>
+          </p:spPr>
+          <p:txBody>
+            <a:bodyPr wrap="square" rtlCol="0">
+              <a:spAutoFit/>
+            </a:bodyPr>
+            <a:lstStyle/>
+            <a:p>
+              <a:r>
+                <a:rPr lang="ja-JP" altLang="en-US" sz="1800" dirty="0">
+                  <a:solidFill>
+                    <a:srgbClr val="C00000"/>
+                  </a:solidFill>
+                </a:rPr>
+                <a:t>②</a:t>
+              </a:r>
+              <a:endParaRPr kumimoji="1" lang="ja-JP" altLang="en-US" sz="1800" dirty="0">
+                <a:solidFill>
+                  <a:srgbClr val="C00000"/>
+                </a:solidFill>
+              </a:endParaRPr>
+            </a:p>
+          </p:txBody>
+        </p:sp>
+        <p:sp>
+          <p:nvSpPr>
+            <p:cNvPr id="29" name="テキスト ボックス 28"/>
+            <p:cNvSpPr txBox="1"/>
+            <p:nvPr/>
+          </p:nvSpPr>
+          <p:spPr>
+            <a:xfrm>
+              <a:off x="6544816" y="5111854"/>
+              <a:ext cx="432048" cy="369332"/>
+            </a:xfrm>
+            <a:prstGeom prst="rect">
+              <a:avLst/>
+            </a:prstGeom>
+            <a:noFill/>
+            <a:ln>
+              <a:noFill/>
+            </a:ln>
+          </p:spPr>
+          <p:txBody>
+            <a:bodyPr wrap="square" rtlCol="0">
+              <a:spAutoFit/>
+            </a:bodyPr>
+            <a:lstStyle/>
+            <a:p>
+              <a:r>
+                <a:rPr lang="ja-JP" altLang="en-US" sz="1800" dirty="0">
+                  <a:solidFill>
+                    <a:srgbClr val="C00000"/>
+                  </a:solidFill>
+                </a:rPr>
+                <a:t>③</a:t>
+              </a:r>
+              <a:endParaRPr kumimoji="1" lang="ja-JP" altLang="en-US" sz="1800" dirty="0">
+                <a:solidFill>
+                  <a:srgbClr val="C00000"/>
+                </a:solidFill>
+              </a:endParaRPr>
+            </a:p>
+          </p:txBody>
+        </p:sp>
+        <p:sp>
+          <p:nvSpPr>
+            <p:cNvPr id="30" name="テキスト ボックス 29"/>
+            <p:cNvSpPr txBox="1"/>
+            <p:nvPr/>
+          </p:nvSpPr>
+          <p:spPr>
+            <a:xfrm>
+              <a:off x="5176664" y="5160640"/>
+              <a:ext cx="432048" cy="369332"/>
+            </a:xfrm>
+            <a:prstGeom prst="rect">
+              <a:avLst/>
+            </a:prstGeom>
+            <a:noFill/>
+            <a:ln>
+              <a:noFill/>
+            </a:ln>
+          </p:spPr>
+          <p:txBody>
+            <a:bodyPr wrap="square" rtlCol="0">
+              <a:spAutoFit/>
+            </a:bodyPr>
+            <a:lstStyle/>
+            <a:p>
+              <a:r>
+                <a:rPr kumimoji="1" lang="ja-JP" altLang="en-US" sz="1800" dirty="0" smtClean="0">
+                  <a:solidFill>
+                    <a:srgbClr val="C00000"/>
+                  </a:solidFill>
+                </a:rPr>
+                <a:t>④</a:t>
+              </a:r>
+              <a:endParaRPr kumimoji="1" lang="ja-JP" altLang="en-US" sz="1800" dirty="0">
+                <a:solidFill>
+                  <a:srgbClr val="C00000"/>
+                </a:solidFill>
+              </a:endParaRPr>
+            </a:p>
+          </p:txBody>
+        </p:sp>
+        <p:sp>
+          <p:nvSpPr>
+            <p:cNvPr id="31" name="テキスト ボックス 30"/>
+            <p:cNvSpPr txBox="1"/>
+            <p:nvPr/>
+          </p:nvSpPr>
+          <p:spPr>
+            <a:xfrm>
+              <a:off x="4929361" y="6240760"/>
+              <a:ext cx="432048" cy="369332"/>
+            </a:xfrm>
+            <a:prstGeom prst="rect">
+              <a:avLst/>
+            </a:prstGeom>
+            <a:noFill/>
+            <a:ln>
+              <a:noFill/>
+            </a:ln>
+          </p:spPr>
+          <p:txBody>
+            <a:bodyPr wrap="square" rtlCol="0">
+              <a:spAutoFit/>
+            </a:bodyPr>
+            <a:lstStyle/>
+            <a:p>
+              <a:r>
+                <a:rPr lang="ja-JP" altLang="en-US" sz="1800" dirty="0">
+                  <a:solidFill>
+                    <a:srgbClr val="C00000"/>
+                  </a:solidFill>
+                </a:rPr>
+                <a:t>⑤</a:t>
+              </a:r>
+              <a:endParaRPr kumimoji="1" lang="ja-JP" altLang="en-US" sz="1800" dirty="0">
+                <a:solidFill>
+                  <a:srgbClr val="C00000"/>
+                </a:solidFill>
+              </a:endParaRPr>
+            </a:p>
+          </p:txBody>
+        </p:sp>
+        <p:sp>
+          <p:nvSpPr>
+            <p:cNvPr id="32" name="テキスト ボックス 31"/>
+            <p:cNvSpPr txBox="1"/>
+            <p:nvPr/>
+          </p:nvSpPr>
+          <p:spPr>
+            <a:xfrm>
+              <a:off x="6400800" y="7392888"/>
+              <a:ext cx="432048" cy="369332"/>
+            </a:xfrm>
+            <a:prstGeom prst="rect">
+              <a:avLst/>
+            </a:prstGeom>
+            <a:noFill/>
+            <a:ln>
+              <a:noFill/>
+            </a:ln>
+          </p:spPr>
+          <p:txBody>
+            <a:bodyPr wrap="square" rtlCol="0">
+              <a:spAutoFit/>
+            </a:bodyPr>
+            <a:lstStyle/>
+            <a:p>
+              <a:r>
+                <a:rPr lang="ja-JP" altLang="en-US" sz="1800" dirty="0">
+                  <a:solidFill>
+                    <a:srgbClr val="C00000"/>
+                  </a:solidFill>
+                </a:rPr>
+                <a:t>⑩</a:t>
+              </a:r>
+              <a:endParaRPr kumimoji="1" lang="ja-JP" altLang="en-US" sz="1800" dirty="0">
+                <a:solidFill>
+                  <a:srgbClr val="C00000"/>
+                </a:solidFill>
+              </a:endParaRPr>
+            </a:p>
+          </p:txBody>
+        </p:sp>
+        <p:sp>
+          <p:nvSpPr>
+            <p:cNvPr id="33" name="テキスト ボックス 32"/>
+            <p:cNvSpPr txBox="1"/>
+            <p:nvPr/>
+          </p:nvSpPr>
+          <p:spPr>
+            <a:xfrm>
+              <a:off x="6131920" y="6533703"/>
+              <a:ext cx="432048" cy="369332"/>
+            </a:xfrm>
+            <a:prstGeom prst="rect">
+              <a:avLst/>
+            </a:prstGeom>
+            <a:noFill/>
+            <a:ln>
+              <a:noFill/>
+            </a:ln>
+          </p:spPr>
+          <p:txBody>
+            <a:bodyPr wrap="square" rtlCol="0">
+              <a:spAutoFit/>
+            </a:bodyPr>
+            <a:lstStyle/>
+            <a:p>
+              <a:r>
+                <a:rPr lang="ja-JP" altLang="en-US" sz="1800" dirty="0">
+                  <a:solidFill>
+                    <a:srgbClr val="C00000"/>
+                  </a:solidFill>
+                </a:rPr>
+                <a:t>⑨</a:t>
+              </a:r>
+              <a:endParaRPr kumimoji="1" lang="ja-JP" altLang="en-US" sz="1800" dirty="0">
+                <a:solidFill>
+                  <a:srgbClr val="C00000"/>
+                </a:solidFill>
+              </a:endParaRPr>
+            </a:p>
+          </p:txBody>
+        </p:sp>
+        <p:sp>
+          <p:nvSpPr>
+            <p:cNvPr id="34" name="テキスト ボックス 33"/>
+            <p:cNvSpPr txBox="1"/>
+            <p:nvPr/>
+          </p:nvSpPr>
+          <p:spPr>
+            <a:xfrm>
+              <a:off x="5538135" y="6600800"/>
+              <a:ext cx="432048" cy="369332"/>
+            </a:xfrm>
+            <a:prstGeom prst="rect">
+              <a:avLst/>
+            </a:prstGeom>
+            <a:noFill/>
+            <a:ln>
+              <a:noFill/>
+            </a:ln>
+          </p:spPr>
+          <p:txBody>
+            <a:bodyPr wrap="square" rtlCol="0">
+              <a:spAutoFit/>
+            </a:bodyPr>
+            <a:lstStyle/>
+            <a:p>
+              <a:r>
+                <a:rPr lang="ja-JP" altLang="en-US" sz="1800" dirty="0">
+                  <a:solidFill>
+                    <a:srgbClr val="C00000"/>
+                  </a:solidFill>
+                </a:rPr>
+                <a:t>⑦</a:t>
+              </a:r>
+              <a:endParaRPr kumimoji="1" lang="ja-JP" altLang="en-US" sz="1800" dirty="0">
+                <a:solidFill>
+                  <a:srgbClr val="C00000"/>
+                </a:solidFill>
+              </a:endParaRPr>
+            </a:p>
+          </p:txBody>
+        </p:sp>
+        <p:sp>
+          <p:nvSpPr>
+            <p:cNvPr id="35" name="テキスト ボックス 34"/>
+            <p:cNvSpPr txBox="1"/>
+            <p:nvPr/>
+          </p:nvSpPr>
+          <p:spPr>
+            <a:xfrm>
+              <a:off x="5401593" y="7464896"/>
+              <a:ext cx="432048" cy="369332"/>
+            </a:xfrm>
+            <a:prstGeom prst="rect">
+              <a:avLst/>
+            </a:prstGeom>
+            <a:noFill/>
+            <a:ln>
+              <a:noFill/>
+            </a:ln>
+          </p:spPr>
+          <p:txBody>
+            <a:bodyPr wrap="square" rtlCol="0">
+              <a:spAutoFit/>
+            </a:bodyPr>
+            <a:lstStyle/>
+            <a:p>
+              <a:r>
+                <a:rPr lang="ja-JP" altLang="en-US" sz="1800" dirty="0">
+                  <a:solidFill>
+                    <a:srgbClr val="C00000"/>
+                  </a:solidFill>
+                </a:rPr>
+                <a:t>⑥</a:t>
+              </a:r>
+              <a:endParaRPr kumimoji="1" lang="ja-JP" altLang="en-US" sz="1800" dirty="0">
+                <a:solidFill>
+                  <a:srgbClr val="C00000"/>
+                </a:solidFill>
+              </a:endParaRPr>
+            </a:p>
+          </p:txBody>
+        </p:sp>
+        <p:sp>
+          <p:nvSpPr>
+            <p:cNvPr id="36" name="テキスト ボックス 35"/>
+            <p:cNvSpPr txBox="1"/>
+            <p:nvPr/>
+          </p:nvSpPr>
+          <p:spPr>
+            <a:xfrm>
+              <a:off x="5608712" y="5763706"/>
+              <a:ext cx="432048" cy="369332"/>
+            </a:xfrm>
+            <a:prstGeom prst="rect">
+              <a:avLst/>
+            </a:prstGeom>
+            <a:noFill/>
+            <a:ln>
+              <a:noFill/>
+            </a:ln>
+          </p:spPr>
+          <p:txBody>
+            <a:bodyPr wrap="square" rtlCol="0">
+              <a:spAutoFit/>
+            </a:bodyPr>
+            <a:lstStyle/>
+            <a:p>
+              <a:r>
+                <a:rPr lang="ja-JP" altLang="en-US" sz="1800" dirty="0">
+                  <a:solidFill>
+                    <a:srgbClr val="C00000"/>
+                  </a:solidFill>
+                </a:rPr>
+                <a:t>⑧</a:t>
+              </a:r>
+              <a:endParaRPr kumimoji="1" lang="ja-JP" altLang="en-US" sz="1800" dirty="0">
+                <a:solidFill>
+                  <a:srgbClr val="C00000"/>
+                </a:solidFill>
+              </a:endParaRPr>
+            </a:p>
+          </p:txBody>
+        </p:sp>
+        <p:cxnSp>
+          <p:nvCxnSpPr>
+            <p:cNvPr id="19" name="直線コネクタ 18"/>
+            <p:cNvCxnSpPr/>
+            <p:nvPr/>
+          </p:nvCxnSpPr>
+          <p:spPr>
+            <a:xfrm>
+              <a:off x="7500695" y="5063851"/>
+              <a:ext cx="0" cy="514898"/>
+            </a:xfrm>
+            <a:prstGeom prst="line">
+              <a:avLst/>
+            </a:prstGeom>
+            <a:ln w="28575">
+              <a:noFill/>
+            </a:ln>
+          </p:spPr>
+          <p:style>
+            <a:lnRef idx="1">
+              <a:schemeClr val="accent1"/>
+            </a:lnRef>
+            <a:fillRef idx="0">
+              <a:schemeClr val="accent1"/>
+            </a:fillRef>
+            <a:effectRef idx="0">
+              <a:schemeClr val="accent1"/>
+            </a:effectRef>
+            <a:fontRef idx="minor">
+              <a:schemeClr val="tx1"/>
+            </a:fontRef>
+          </p:style>
+        </p:cxnSp>
+        <p:cxnSp>
+          <p:nvCxnSpPr>
+            <p:cNvPr id="38" name="直線コネクタ 37"/>
+            <p:cNvCxnSpPr/>
+            <p:nvPr/>
+          </p:nvCxnSpPr>
+          <p:spPr>
+            <a:xfrm>
+              <a:off x="7048872" y="5087857"/>
+              <a:ext cx="0" cy="514898"/>
+            </a:xfrm>
+            <a:prstGeom prst="line">
+              <a:avLst/>
+            </a:prstGeom>
+            <a:ln w="28575">
+              <a:noFill/>
+            </a:ln>
+          </p:spPr>
+          <p:style>
+            <a:lnRef idx="1">
+              <a:schemeClr val="accent1"/>
+            </a:lnRef>
+            <a:fillRef idx="0">
+              <a:schemeClr val="accent1"/>
+            </a:fillRef>
+            <a:effectRef idx="0">
+              <a:schemeClr val="accent1"/>
+            </a:effectRef>
+            <a:fontRef idx="minor">
+              <a:schemeClr val="tx1"/>
+            </a:fontRef>
+          </p:style>
+        </p:cxnSp>
+        <p:cxnSp>
+          <p:nvCxnSpPr>
+            <p:cNvPr id="39" name="直線コネクタ 38"/>
+            <p:cNvCxnSpPr/>
+            <p:nvPr/>
+          </p:nvCxnSpPr>
+          <p:spPr>
+            <a:xfrm>
+              <a:off x="5680720" y="5032323"/>
+              <a:ext cx="0" cy="514898"/>
+            </a:xfrm>
+            <a:prstGeom prst="line">
+              <a:avLst/>
+            </a:prstGeom>
+            <a:ln w="28575">
+              <a:noFill/>
+            </a:ln>
+          </p:spPr>
+          <p:style>
+            <a:lnRef idx="1">
+              <a:schemeClr val="accent1"/>
+            </a:lnRef>
+            <a:fillRef idx="0">
+              <a:schemeClr val="accent1"/>
+            </a:fillRef>
+            <a:effectRef idx="0">
+              <a:schemeClr val="accent1"/>
+            </a:effectRef>
+            <a:fontRef idx="minor">
+              <a:schemeClr val="tx1"/>
+            </a:fontRef>
+          </p:style>
+        </p:cxnSp>
+        <p:cxnSp>
+          <p:nvCxnSpPr>
+            <p:cNvPr id="40" name="直線コネクタ 39"/>
+            <p:cNvCxnSpPr/>
+            <p:nvPr/>
+          </p:nvCxnSpPr>
+          <p:spPr>
+            <a:xfrm>
+              <a:off x="4912583" y="5763706"/>
+              <a:ext cx="489010" cy="0"/>
+            </a:xfrm>
+            <a:prstGeom prst="line">
+              <a:avLst/>
+            </a:prstGeom>
+            <a:ln w="28575">
+              <a:noFill/>
+            </a:ln>
+          </p:spPr>
+          <p:style>
+            <a:lnRef idx="1">
+              <a:schemeClr val="accent1"/>
+            </a:lnRef>
+            <a:fillRef idx="0">
+              <a:schemeClr val="accent1"/>
+            </a:fillRef>
+            <a:effectRef idx="0">
+              <a:schemeClr val="accent1"/>
+            </a:effectRef>
+            <a:fontRef idx="minor">
+              <a:schemeClr val="tx1"/>
+            </a:fontRef>
+          </p:style>
+        </p:cxnSp>
+        <p:cxnSp>
+          <p:nvCxnSpPr>
+            <p:cNvPr id="44" name="直線コネクタ 43"/>
+            <p:cNvCxnSpPr/>
+            <p:nvPr/>
+          </p:nvCxnSpPr>
+          <p:spPr>
+            <a:xfrm>
+              <a:off x="4856321" y="7176864"/>
+              <a:ext cx="489010" cy="0"/>
+            </a:xfrm>
+            <a:prstGeom prst="line">
+              <a:avLst/>
+            </a:prstGeom>
+            <a:ln w="28575">
+              <a:noFill/>
+            </a:ln>
+          </p:spPr>
+          <p:style>
+            <a:lnRef idx="1">
+              <a:schemeClr val="accent1"/>
+            </a:lnRef>
+            <a:fillRef idx="0">
+              <a:schemeClr val="accent1"/>
+            </a:fillRef>
+            <a:effectRef idx="0">
+              <a:schemeClr val="accent1"/>
+            </a:effectRef>
+            <a:fontRef idx="minor">
+              <a:schemeClr val="tx1"/>
+            </a:fontRef>
+          </p:style>
+        </p:cxnSp>
+        <p:cxnSp>
+          <p:nvCxnSpPr>
+            <p:cNvPr id="45" name="直線コネクタ 44"/>
+            <p:cNvCxnSpPr/>
+            <p:nvPr/>
+          </p:nvCxnSpPr>
+          <p:spPr>
+            <a:xfrm>
+              <a:off x="5755590" y="7176864"/>
+              <a:ext cx="429186" cy="0"/>
+            </a:xfrm>
+            <a:prstGeom prst="line">
+              <a:avLst/>
+            </a:prstGeom>
+            <a:ln w="28575">
+              <a:noFill/>
+            </a:ln>
+          </p:spPr>
+          <p:style>
+            <a:lnRef idx="1">
+              <a:schemeClr val="accent1"/>
+            </a:lnRef>
+            <a:fillRef idx="0">
+              <a:schemeClr val="accent1"/>
+            </a:fillRef>
+            <a:effectRef idx="0">
+              <a:schemeClr val="accent1"/>
+            </a:effectRef>
+            <a:fontRef idx="minor">
+              <a:schemeClr val="tx1"/>
+            </a:fontRef>
+          </p:style>
+        </p:cxnSp>
+        <p:cxnSp>
+          <p:nvCxnSpPr>
+            <p:cNvPr id="46" name="直線コネクタ 45"/>
+            <p:cNvCxnSpPr/>
+            <p:nvPr/>
+          </p:nvCxnSpPr>
+          <p:spPr>
+            <a:xfrm>
+              <a:off x="5319102" y="6238949"/>
+              <a:ext cx="489010" cy="0"/>
+            </a:xfrm>
+            <a:prstGeom prst="line">
+              <a:avLst/>
+            </a:prstGeom>
+            <a:ln w="28575">
+              <a:noFill/>
+            </a:ln>
+          </p:spPr>
+          <p:style>
+            <a:lnRef idx="1">
+              <a:schemeClr val="accent1"/>
+            </a:lnRef>
+            <a:fillRef idx="0">
+              <a:schemeClr val="accent1"/>
+            </a:fillRef>
+            <a:effectRef idx="0">
+              <a:schemeClr val="accent1"/>
+            </a:effectRef>
+            <a:fontRef idx="minor">
+              <a:schemeClr val="tx1"/>
+            </a:fontRef>
+          </p:style>
+        </p:cxnSp>
+        <p:cxnSp>
+          <p:nvCxnSpPr>
+            <p:cNvPr id="47" name="直線コネクタ 46"/>
+            <p:cNvCxnSpPr/>
+            <p:nvPr/>
+          </p:nvCxnSpPr>
+          <p:spPr>
+            <a:xfrm>
+              <a:off x="6055806" y="6436315"/>
+              <a:ext cx="489010" cy="0"/>
+            </a:xfrm>
+            <a:prstGeom prst="line">
+              <a:avLst/>
+            </a:prstGeom>
+            <a:ln w="28575">
+              <a:noFill/>
+            </a:ln>
+          </p:spPr>
+          <p:style>
+            <a:lnRef idx="1">
+              <a:schemeClr val="accent1"/>
+            </a:lnRef>
+            <a:fillRef idx="0">
+              <a:schemeClr val="accent1"/>
+            </a:fillRef>
+            <a:effectRef idx="0">
+              <a:schemeClr val="accent1"/>
+            </a:effectRef>
+            <a:fontRef idx="minor">
+              <a:schemeClr val="tx1"/>
+            </a:fontRef>
+          </p:style>
+        </p:cxnSp>
+        <p:cxnSp>
+          <p:nvCxnSpPr>
+            <p:cNvPr id="48" name="直線コネクタ 47"/>
+            <p:cNvCxnSpPr/>
+            <p:nvPr/>
+          </p:nvCxnSpPr>
+          <p:spPr>
+            <a:xfrm>
+              <a:off x="6256784" y="7248872"/>
+              <a:ext cx="341605" cy="0"/>
+            </a:xfrm>
+            <a:prstGeom prst="line">
+              <a:avLst/>
+            </a:prstGeom>
+            <a:ln w="28575">
+              <a:noFill/>
+            </a:ln>
+          </p:spPr>
+          <p:style>
+            <a:lnRef idx="1">
+              <a:schemeClr val="accent1"/>
+            </a:lnRef>
+            <a:fillRef idx="0">
+              <a:schemeClr val="accent1"/>
+            </a:fillRef>
+            <a:effectRef idx="0">
+              <a:schemeClr val="accent1"/>
+            </a:effectRef>
+            <a:fontRef idx="minor">
+              <a:schemeClr val="tx1"/>
+            </a:fontRef>
+          </p:style>
+        </p:cxnSp>
+        <p:cxnSp>
+          <p:nvCxnSpPr>
+            <p:cNvPr id="59" name="直線コネクタ 58"/>
+            <p:cNvCxnSpPr/>
+            <p:nvPr/>
+          </p:nvCxnSpPr>
+          <p:spPr>
+            <a:xfrm>
+              <a:off x="6904856" y="7464896"/>
+              <a:ext cx="0" cy="442115"/>
+            </a:xfrm>
+            <a:prstGeom prst="line">
+              <a:avLst/>
+            </a:prstGeom>
+            <a:ln w="28575">
+              <a:noFill/>
+            </a:ln>
+          </p:spPr>
+          <p:style>
+            <a:lnRef idx="1">
+              <a:schemeClr val="accent1"/>
+            </a:lnRef>
+            <a:fillRef idx="0">
+              <a:schemeClr val="accent1"/>
+            </a:fillRef>
+            <a:effectRef idx="0">
+              <a:schemeClr val="accent1"/>
+            </a:effectRef>
+            <a:fontRef idx="minor">
+              <a:schemeClr val="tx1"/>
+            </a:fontRef>
+          </p:style>
+        </p:cxnSp>
+        <p:cxnSp>
+          <p:nvCxnSpPr>
+            <p:cNvPr id="61" name="直線コネクタ 60"/>
+            <p:cNvCxnSpPr/>
+            <p:nvPr/>
+          </p:nvCxnSpPr>
+          <p:spPr>
+            <a:xfrm>
+              <a:off x="7336904" y="7464895"/>
+              <a:ext cx="0" cy="442115"/>
+            </a:xfrm>
+            <a:prstGeom prst="line">
+              <a:avLst/>
+            </a:prstGeom>
+            <a:ln w="28575">
+              <a:noFill/>
+            </a:ln>
+          </p:spPr>
+          <p:style>
+            <a:lnRef idx="1">
+              <a:schemeClr val="accent1"/>
+            </a:lnRef>
+            <a:fillRef idx="0">
+              <a:schemeClr val="accent1"/>
+            </a:fillRef>
+            <a:effectRef idx="0">
+              <a:schemeClr val="accent1"/>
+            </a:effectRef>
+            <a:fontRef idx="minor">
+              <a:schemeClr val="tx1"/>
+            </a:fontRef>
+          </p:style>
+        </p:cxnSp>
+        <p:cxnSp>
+          <p:nvCxnSpPr>
+            <p:cNvPr id="65" name="直線コネクタ 64"/>
+            <p:cNvCxnSpPr/>
+            <p:nvPr/>
+          </p:nvCxnSpPr>
+          <p:spPr>
+            <a:xfrm>
+              <a:off x="7336904" y="6991423"/>
+              <a:ext cx="0" cy="257449"/>
+            </a:xfrm>
+            <a:prstGeom prst="line">
+              <a:avLst/>
+            </a:prstGeom>
+            <a:ln w="28575">
+              <a:noFill/>
+            </a:ln>
+          </p:spPr>
+          <p:style>
+            <a:lnRef idx="1">
+              <a:schemeClr val="accent1"/>
+            </a:lnRef>
+            <a:fillRef idx="0">
+              <a:schemeClr val="accent1"/>
+            </a:fillRef>
+            <a:effectRef idx="0">
+              <a:schemeClr val="accent1"/>
+            </a:effectRef>
+            <a:fontRef idx="minor">
+              <a:schemeClr val="tx1"/>
+            </a:fontRef>
+          </p:style>
+        </p:cxnSp>
+        <p:cxnSp>
+          <p:nvCxnSpPr>
+            <p:cNvPr id="68" name="直線コネクタ 67"/>
+            <p:cNvCxnSpPr/>
+            <p:nvPr/>
+          </p:nvCxnSpPr>
+          <p:spPr>
+            <a:xfrm>
+              <a:off x="6921797" y="6991422"/>
+              <a:ext cx="0" cy="257449"/>
+            </a:xfrm>
+            <a:prstGeom prst="line">
+              <a:avLst/>
+            </a:prstGeom>
+            <a:ln w="28575">
+              <a:noFill/>
+            </a:ln>
+          </p:spPr>
+          <p:style>
+            <a:lnRef idx="1">
+              <a:schemeClr val="accent1"/>
+            </a:lnRef>
+            <a:fillRef idx="0">
+              <a:schemeClr val="accent1"/>
+            </a:fillRef>
+            <a:effectRef idx="0">
+              <a:schemeClr val="accent1"/>
+            </a:effectRef>
+            <a:fontRef idx="minor">
+              <a:schemeClr val="tx1"/>
+            </a:fontRef>
+          </p:style>
+        </p:cxnSp>
+        <p:cxnSp>
+          <p:nvCxnSpPr>
+            <p:cNvPr id="69" name="直線コネクタ 68"/>
+            <p:cNvCxnSpPr/>
+            <p:nvPr/>
+          </p:nvCxnSpPr>
+          <p:spPr>
+            <a:xfrm flipH="1">
+              <a:off x="6598389" y="6905553"/>
+              <a:ext cx="281385" cy="0"/>
+            </a:xfrm>
+            <a:prstGeom prst="line">
+              <a:avLst/>
+            </a:prstGeom>
+            <a:ln w="28575">
+              <a:noFill/>
+            </a:ln>
+          </p:spPr>
+          <p:style>
+            <a:lnRef idx="1">
+              <a:schemeClr val="accent1"/>
+            </a:lnRef>
+            <a:fillRef idx="0">
+              <a:schemeClr val="accent1"/>
+            </a:fillRef>
+            <a:effectRef idx="0">
+              <a:schemeClr val="accent1"/>
+            </a:effectRef>
+            <a:fontRef idx="minor">
+              <a:schemeClr val="tx1"/>
+            </a:fontRef>
+          </p:style>
+        </p:cxnSp>
+        <p:cxnSp>
+          <p:nvCxnSpPr>
+            <p:cNvPr id="71" name="直線コネクタ 70"/>
+            <p:cNvCxnSpPr/>
+            <p:nvPr/>
+          </p:nvCxnSpPr>
+          <p:spPr>
+            <a:xfrm flipH="1">
+              <a:off x="6563968" y="6096744"/>
+              <a:ext cx="281385" cy="0"/>
+            </a:xfrm>
+            <a:prstGeom prst="line">
+              <a:avLst/>
+            </a:prstGeom>
+            <a:ln w="28575">
+              <a:noFill/>
+            </a:ln>
+          </p:spPr>
+          <p:style>
+            <a:lnRef idx="1">
+              <a:schemeClr val="accent1"/>
+            </a:lnRef>
+            <a:fillRef idx="0">
+              <a:schemeClr val="accent1"/>
+            </a:fillRef>
+            <a:effectRef idx="0">
+              <a:schemeClr val="accent1"/>
+            </a:effectRef>
+            <a:fontRef idx="minor">
+              <a:schemeClr val="tx1"/>
+            </a:fontRef>
+          </p:style>
+        </p:cxnSp>
+        <p:cxnSp>
+          <p:nvCxnSpPr>
+            <p:cNvPr id="74" name="直線コネクタ 73"/>
+            <p:cNvCxnSpPr/>
+            <p:nvPr/>
+          </p:nvCxnSpPr>
+          <p:spPr>
+            <a:xfrm>
+              <a:off x="8345016" y="5763706"/>
+              <a:ext cx="0" cy="257449"/>
+            </a:xfrm>
+            <a:prstGeom prst="line">
+              <a:avLst/>
+            </a:prstGeom>
+            <a:ln w="28575">
+              <a:noFill/>
+            </a:ln>
+          </p:spPr>
+          <p:style>
+            <a:lnRef idx="1">
+              <a:schemeClr val="accent1"/>
+            </a:lnRef>
+            <a:fillRef idx="0">
+              <a:schemeClr val="accent1"/>
+            </a:fillRef>
+            <a:effectRef idx="0">
+              <a:schemeClr val="accent1"/>
+            </a:effectRef>
+            <a:fontRef idx="minor">
+              <a:schemeClr val="tx1"/>
+            </a:fontRef>
+          </p:style>
+        </p:cxnSp>
+        <p:cxnSp>
+          <p:nvCxnSpPr>
+            <p:cNvPr id="75" name="直線コネクタ 74"/>
+            <p:cNvCxnSpPr/>
+            <p:nvPr/>
+          </p:nvCxnSpPr>
+          <p:spPr>
+            <a:xfrm>
+              <a:off x="7048872" y="5750636"/>
+              <a:ext cx="0" cy="257449"/>
+            </a:xfrm>
+            <a:prstGeom prst="line">
+              <a:avLst/>
+            </a:prstGeom>
+            <a:ln w="28575">
+              <a:noFill/>
+            </a:ln>
+          </p:spPr>
+          <p:style>
+            <a:lnRef idx="1">
+              <a:schemeClr val="accent1"/>
+            </a:lnRef>
+            <a:fillRef idx="0">
+              <a:schemeClr val="accent1"/>
+            </a:fillRef>
+            <a:effectRef idx="0">
+              <a:schemeClr val="accent1"/>
+            </a:effectRef>
+            <a:fontRef idx="minor">
+              <a:schemeClr val="tx1"/>
+            </a:fontRef>
+          </p:style>
+        </p:cxnSp>
+        <p:cxnSp>
+          <p:nvCxnSpPr>
+            <p:cNvPr id="77" name="直線コネクタ 76"/>
+            <p:cNvCxnSpPr/>
+            <p:nvPr/>
+          </p:nvCxnSpPr>
+          <p:spPr>
+            <a:xfrm flipH="1" flipV="1">
+              <a:off x="7840960" y="7651864"/>
+              <a:ext cx="1" cy="271306"/>
+            </a:xfrm>
+            <a:prstGeom prst="line">
+              <a:avLst/>
+            </a:prstGeom>
+            <a:ln w="28575">
+              <a:noFill/>
+            </a:ln>
+          </p:spPr>
+          <p:style>
+            <a:lnRef idx="1">
+              <a:schemeClr val="accent1"/>
+            </a:lnRef>
+            <a:fillRef idx="0">
+              <a:schemeClr val="accent1"/>
+            </a:fillRef>
+            <a:effectRef idx="0">
+              <a:schemeClr val="accent1"/>
+            </a:effectRef>
+            <a:fontRef idx="minor">
+              <a:schemeClr val="tx1"/>
+            </a:fontRef>
+          </p:style>
+        </p:cxnSp>
+        <p:cxnSp>
+          <p:nvCxnSpPr>
+            <p:cNvPr id="80" name="直線コネクタ 79"/>
+            <p:cNvCxnSpPr/>
+            <p:nvPr/>
+          </p:nvCxnSpPr>
+          <p:spPr>
+            <a:xfrm flipH="1">
+              <a:off x="8063631" y="7402341"/>
+              <a:ext cx="281385" cy="0"/>
+            </a:xfrm>
+            <a:prstGeom prst="line">
+              <a:avLst/>
+            </a:prstGeom>
+            <a:ln w="28575">
+              <a:noFill/>
+            </a:ln>
+          </p:spPr>
+          <p:style>
+            <a:lnRef idx="1">
+              <a:schemeClr val="accent1"/>
+            </a:lnRef>
+            <a:fillRef idx="0">
+              <a:schemeClr val="accent1"/>
+            </a:fillRef>
+            <a:effectRef idx="0">
+              <a:schemeClr val="accent1"/>
+            </a:effectRef>
+            <a:fontRef idx="minor">
+              <a:schemeClr val="tx1"/>
+            </a:fontRef>
+          </p:style>
+        </p:cxnSp>
+        <p:cxnSp>
+          <p:nvCxnSpPr>
+            <p:cNvPr id="81" name="直線コネクタ 80"/>
+            <p:cNvCxnSpPr/>
+            <p:nvPr/>
+          </p:nvCxnSpPr>
+          <p:spPr>
+            <a:xfrm flipV="1">
+              <a:off x="7910661" y="6733978"/>
+              <a:ext cx="0" cy="236154"/>
+            </a:xfrm>
+            <a:prstGeom prst="line">
+              <a:avLst/>
+            </a:prstGeom>
+            <a:ln w="28575">
+              <a:noFill/>
+            </a:ln>
+          </p:spPr>
+          <p:style>
+            <a:lnRef idx="1">
+              <a:schemeClr val="accent1"/>
+            </a:lnRef>
+            <a:fillRef idx="0">
+              <a:schemeClr val="accent1"/>
+            </a:fillRef>
+            <a:effectRef idx="0">
+              <a:schemeClr val="accent1"/>
+            </a:effectRef>
+            <a:fontRef idx="minor">
+              <a:schemeClr val="tx1"/>
+            </a:fontRef>
+          </p:style>
+        </p:cxnSp>
+        <p:cxnSp>
+          <p:nvCxnSpPr>
+            <p:cNvPr id="85" name="直線コネクタ 84"/>
+            <p:cNvCxnSpPr/>
+            <p:nvPr/>
+          </p:nvCxnSpPr>
+          <p:spPr>
+            <a:xfrm flipV="1">
+              <a:off x="7392060" y="6277358"/>
+              <a:ext cx="0" cy="236154"/>
+            </a:xfrm>
+            <a:prstGeom prst="line">
+              <a:avLst/>
+            </a:prstGeom>
+            <a:ln w="28575">
+              <a:noFill/>
+            </a:ln>
+          </p:spPr>
+          <p:style>
+            <a:lnRef idx="1">
+              <a:schemeClr val="accent1"/>
+            </a:lnRef>
+            <a:fillRef idx="0">
+              <a:schemeClr val="accent1"/>
+            </a:fillRef>
+            <a:effectRef idx="0">
+              <a:schemeClr val="accent1"/>
+            </a:effectRef>
+            <a:fontRef idx="minor">
+              <a:schemeClr val="tx1"/>
+            </a:fontRef>
+          </p:style>
+        </p:cxnSp>
+        <p:cxnSp>
+          <p:nvCxnSpPr>
+            <p:cNvPr id="86" name="直線コネクタ 85"/>
+            <p:cNvCxnSpPr/>
+            <p:nvPr/>
+          </p:nvCxnSpPr>
+          <p:spPr>
+            <a:xfrm flipV="1">
+              <a:off x="7264896" y="6733978"/>
+              <a:ext cx="0" cy="236154"/>
+            </a:xfrm>
+            <a:prstGeom prst="line">
+              <a:avLst/>
+            </a:prstGeom>
+            <a:ln w="28575">
+              <a:noFill/>
+            </a:ln>
+          </p:spPr>
+          <p:style>
+            <a:lnRef idx="1">
+              <a:schemeClr val="accent1"/>
+            </a:lnRef>
+            <a:fillRef idx="0">
+              <a:schemeClr val="accent1"/>
+            </a:fillRef>
+            <a:effectRef idx="0">
+              <a:schemeClr val="accent1"/>
+            </a:effectRef>
+            <a:fontRef idx="minor">
+              <a:schemeClr val="tx1"/>
+            </a:fontRef>
+          </p:style>
+        </p:cxnSp>
+        <p:cxnSp>
+          <p:nvCxnSpPr>
+            <p:cNvPr id="88" name="直線コネクタ 87"/>
+            <p:cNvCxnSpPr/>
+            <p:nvPr/>
+          </p:nvCxnSpPr>
+          <p:spPr>
+            <a:xfrm flipV="1">
+              <a:off x="8204323" y="6267230"/>
+              <a:ext cx="0" cy="236154"/>
+            </a:xfrm>
+            <a:prstGeom prst="line">
+              <a:avLst/>
+            </a:prstGeom>
+            <a:ln w="28575">
+              <a:noFill/>
+            </a:ln>
+          </p:spPr>
+          <p:style>
+            <a:lnRef idx="1">
+              <a:schemeClr val="accent1"/>
+            </a:lnRef>
+            <a:fillRef idx="0">
+              <a:schemeClr val="accent1"/>
+            </a:fillRef>
+            <a:effectRef idx="0">
+              <a:schemeClr val="accent1"/>
+            </a:effectRef>
+            <a:fontRef idx="minor">
+              <a:schemeClr val="tx1"/>
+            </a:fontRef>
+          </p:style>
+        </p:cxnSp>
+        <p:cxnSp>
+          <p:nvCxnSpPr>
+            <p:cNvPr id="89" name="直線コネクタ 88"/>
+            <p:cNvCxnSpPr/>
+            <p:nvPr/>
+          </p:nvCxnSpPr>
+          <p:spPr>
+            <a:xfrm>
+              <a:off x="8356723" y="6655784"/>
+              <a:ext cx="204317" cy="0"/>
+            </a:xfrm>
+            <a:prstGeom prst="line">
+              <a:avLst/>
+            </a:prstGeom>
+            <a:ln w="28575">
+              <a:noFill/>
+            </a:ln>
+          </p:spPr>
+          <p:style>
+            <a:lnRef idx="1">
+              <a:schemeClr val="accent1"/>
+            </a:lnRef>
+            <a:fillRef idx="0">
+              <a:schemeClr val="accent1"/>
+            </a:fillRef>
+            <a:effectRef idx="0">
+              <a:schemeClr val="accent1"/>
+            </a:effectRef>
+            <a:fontRef idx="minor">
+              <a:schemeClr val="tx1"/>
+            </a:fontRef>
+          </p:style>
+        </p:cxnSp>
+        <p:cxnSp>
+          <p:nvCxnSpPr>
+            <p:cNvPr id="91" name="直線コネクタ 90"/>
+            <p:cNvCxnSpPr/>
+            <p:nvPr/>
+          </p:nvCxnSpPr>
+          <p:spPr>
+            <a:xfrm>
+              <a:off x="8356723" y="7575363"/>
+              <a:ext cx="204317" cy="0"/>
+            </a:xfrm>
+            <a:prstGeom prst="line">
+              <a:avLst/>
+            </a:prstGeom>
+            <a:ln w="28575">
+              <a:noFill/>
+            </a:ln>
+          </p:spPr>
+          <p:style>
+            <a:lnRef idx="1">
+              <a:schemeClr val="accent1"/>
+            </a:lnRef>
+            <a:fillRef idx="0">
+              <a:schemeClr val="accent1"/>
+            </a:fillRef>
+            <a:effectRef idx="0">
+              <a:schemeClr val="accent1"/>
+            </a:effectRef>
+            <a:fontRef idx="minor">
+              <a:schemeClr val="tx1"/>
+            </a:fontRef>
+          </p:style>
+        </p:cxnSp>
+        <p:cxnSp>
+          <p:nvCxnSpPr>
+            <p:cNvPr id="98" name="直線コネクタ 97"/>
+            <p:cNvCxnSpPr/>
+            <p:nvPr/>
+          </p:nvCxnSpPr>
+          <p:spPr>
+            <a:xfrm flipH="1">
+              <a:off x="8811764" y="7176864"/>
+              <a:ext cx="281385" cy="0"/>
+            </a:xfrm>
+            <a:prstGeom prst="line">
+              <a:avLst/>
+            </a:prstGeom>
+            <a:ln w="28575">
+              <a:noFill/>
+            </a:ln>
+          </p:spPr>
+          <p:style>
+            <a:lnRef idx="1">
+              <a:schemeClr val="accent1"/>
+            </a:lnRef>
+            <a:fillRef idx="0">
+              <a:schemeClr val="accent1"/>
+            </a:fillRef>
+            <a:effectRef idx="0">
+              <a:schemeClr val="accent1"/>
+            </a:effectRef>
+            <a:fontRef idx="minor">
+              <a:schemeClr val="tx1"/>
+            </a:fontRef>
+          </p:style>
+        </p:cxnSp>
+        <p:cxnSp>
+          <p:nvCxnSpPr>
+            <p:cNvPr id="99" name="直線コネクタ 98"/>
+            <p:cNvCxnSpPr/>
+            <p:nvPr/>
+          </p:nvCxnSpPr>
+          <p:spPr>
+            <a:xfrm flipH="1">
+              <a:off x="8794947" y="7575363"/>
+              <a:ext cx="281385" cy="0"/>
+            </a:xfrm>
+            <a:prstGeom prst="line">
+              <a:avLst/>
+            </a:prstGeom>
+            <a:ln w="28575">
+              <a:noFill/>
+            </a:ln>
+          </p:spPr>
+          <p:style>
+            <a:lnRef idx="1">
+              <a:schemeClr val="accent1"/>
+            </a:lnRef>
+            <a:fillRef idx="0">
+              <a:schemeClr val="accent1"/>
+            </a:fillRef>
+            <a:effectRef idx="0">
+              <a:schemeClr val="accent1"/>
+            </a:effectRef>
+            <a:fontRef idx="minor">
+              <a:schemeClr val="tx1"/>
+            </a:fontRef>
+          </p:style>
+        </p:cxnSp>
+      </p:grpSp>
+      <p:pic>
+        <p:nvPicPr>
+          <p:cNvPr id="1026" name="Picture 2" descr="C:\Users\HOMMA\Robokon\e-konbu\Illust\階段.png"/>
+          <p:cNvPicPr>
+            <a:picLocks noChangeAspect="1" noChangeArrowheads="1"/>
+          </p:cNvPicPr>
+          <p:nvPr/>
+        </p:nvPicPr>
+        <p:blipFill>
+          <a:blip r:embed="rId3" cstate="print">
+            <a:extLst>
+              <a:ext uri="{28A0092B-C50C-407E-A947-70E740481C1C}">
+                <a14:useLocalDpi xmlns:a14="http://schemas.microsoft.com/office/drawing/2010/main" val="0"/>
+              </a:ext>
+            </a:extLst>
+          </a:blip>
+          <a:srcRect/>
+          <a:stretch>
+            <a:fillRect/>
+          </a:stretch>
+        </p:blipFill>
+        <p:spPr bwMode="auto">
+          <a:xfrm>
+            <a:off x="7632526" y="7549588"/>
+            <a:ext cx="3038862" cy="353569"/>
+          </a:xfrm>
+          <a:prstGeom prst="rect">
+            <a:avLst/>
+          </a:prstGeom>
+          <a:noFill/>
+          <a:extLst>
+            <a:ext uri="{909E8E84-426E-40DD-AFC4-6F175D3DCCD1}">
+              <a14:hiddenFill xmlns:a14="http://schemas.microsoft.com/office/drawing/2010/main">
+                <a:solidFill>
+                  <a:srgbClr val="FFFFFF"/>
+                </a:solidFill>
+              </a14:hiddenFill>
+            </a:ext>
+          </a:extLst>
+        </p:spPr>
+      </p:pic>
+      <p:cxnSp>
+        <p:nvCxnSpPr>
+          <p:cNvPr id="102" name="直線コネクタ 101"/>
+          <p:cNvCxnSpPr/>
+          <p:nvPr/>
+        </p:nvCxnSpPr>
+        <p:spPr>
+          <a:xfrm>
+            <a:off x="9864774" y="7117113"/>
+            <a:ext cx="0" cy="1011050"/>
+          </a:xfrm>
+          <a:prstGeom prst="line">
+            <a:avLst/>
+          </a:prstGeom>
+          <a:ln w="28575">
+            <a:solidFill>
+              <a:schemeClr val="tx1"/>
+            </a:solidFill>
+            <a:prstDash val="sysDot"/>
+          </a:ln>
+        </p:spPr>
+        <p:style>
+          <a:lnRef idx="1">
+            <a:schemeClr val="accent1"/>
+          </a:lnRef>
+          <a:fillRef idx="0">
+            <a:schemeClr val="accent1"/>
+          </a:fillRef>
+          <a:effectRef idx="0">
+            <a:schemeClr val="accent1"/>
+          </a:effectRef>
+          <a:fontRef idx="minor">
+            <a:schemeClr val="tx1"/>
+          </a:fontRef>
+        </p:style>
+      </p:cxnSp>
+      <p:cxnSp>
+        <p:nvCxnSpPr>
+          <p:cNvPr id="104" name="直線コネクタ 103"/>
+          <p:cNvCxnSpPr/>
+          <p:nvPr/>
+        </p:nvCxnSpPr>
+        <p:spPr>
+          <a:xfrm>
+            <a:off x="7848550" y="7044063"/>
+            <a:ext cx="0" cy="1011050"/>
+          </a:xfrm>
+          <a:prstGeom prst="line">
+            <a:avLst/>
+          </a:prstGeom>
+          <a:ln w="28575">
+            <a:solidFill>
+              <a:schemeClr val="tx1"/>
+            </a:solidFill>
+            <a:prstDash val="sysDot"/>
+          </a:ln>
+        </p:spPr>
+        <p:style>
+          <a:lnRef idx="1">
+            <a:schemeClr val="accent1"/>
+          </a:lnRef>
+          <a:fillRef idx="0">
+            <a:schemeClr val="accent1"/>
+          </a:fillRef>
+          <a:effectRef idx="0">
+            <a:schemeClr val="accent1"/>
+          </a:effectRef>
+          <a:fontRef idx="minor">
+            <a:schemeClr val="tx1"/>
+          </a:fontRef>
+        </p:style>
+      </p:cxnSp>
+      <p:cxnSp>
+        <p:nvCxnSpPr>
+          <p:cNvPr id="105" name="直線コネクタ 104"/>
+          <p:cNvCxnSpPr/>
+          <p:nvPr/>
+        </p:nvCxnSpPr>
+        <p:spPr>
+          <a:xfrm>
+            <a:off x="8352606" y="7061192"/>
+            <a:ext cx="0" cy="1011050"/>
+          </a:xfrm>
+          <a:prstGeom prst="line">
+            <a:avLst/>
+          </a:prstGeom>
+          <a:ln w="28575">
+            <a:solidFill>
+              <a:schemeClr val="tx1"/>
+            </a:solidFill>
+            <a:prstDash val="sysDot"/>
+          </a:ln>
+        </p:spPr>
+        <p:style>
+          <a:lnRef idx="1">
+            <a:schemeClr val="accent1"/>
+          </a:lnRef>
+          <a:fillRef idx="0">
+            <a:schemeClr val="accent1"/>
+          </a:fillRef>
+          <a:effectRef idx="0">
+            <a:schemeClr val="accent1"/>
+          </a:effectRef>
+          <a:fontRef idx="minor">
+            <a:schemeClr val="tx1"/>
+          </a:fontRef>
+        </p:style>
+      </p:cxnSp>
+      <p:cxnSp>
+        <p:nvCxnSpPr>
+          <p:cNvPr id="106" name="直線コネクタ 105"/>
+          <p:cNvCxnSpPr/>
+          <p:nvPr/>
+        </p:nvCxnSpPr>
+        <p:spPr>
+          <a:xfrm>
+            <a:off x="8712646" y="7078774"/>
+            <a:ext cx="0" cy="1011050"/>
+          </a:xfrm>
+          <a:prstGeom prst="line">
+            <a:avLst/>
+          </a:prstGeom>
+          <a:ln w="28575">
+            <a:solidFill>
+              <a:schemeClr val="tx1"/>
+            </a:solidFill>
+            <a:prstDash val="sysDot"/>
+          </a:ln>
+        </p:spPr>
+        <p:style>
+          <a:lnRef idx="1">
+            <a:schemeClr val="accent1"/>
+          </a:lnRef>
+          <a:fillRef idx="0">
+            <a:schemeClr val="accent1"/>
+          </a:fillRef>
+          <a:effectRef idx="0">
+            <a:schemeClr val="accent1"/>
+          </a:effectRef>
+          <a:fontRef idx="minor">
+            <a:schemeClr val="tx1"/>
+          </a:fontRef>
+        </p:style>
+      </p:cxnSp>
+      <p:cxnSp>
+        <p:nvCxnSpPr>
+          <p:cNvPr id="107" name="直線コネクタ 106"/>
+          <p:cNvCxnSpPr/>
+          <p:nvPr/>
+        </p:nvCxnSpPr>
+        <p:spPr>
+          <a:xfrm>
+            <a:off x="7632526" y="7044063"/>
+            <a:ext cx="0" cy="1011050"/>
+          </a:xfrm>
+          <a:prstGeom prst="line">
+            <a:avLst/>
+          </a:prstGeom>
+          <a:ln w="28575">
+            <a:solidFill>
+              <a:schemeClr val="tx1"/>
+            </a:solidFill>
+            <a:prstDash val="sysDot"/>
+          </a:ln>
+        </p:spPr>
+        <p:style>
+          <a:lnRef idx="1">
+            <a:schemeClr val="accent1"/>
+          </a:lnRef>
+          <a:fillRef idx="0">
+            <a:schemeClr val="accent1"/>
+          </a:fillRef>
+          <a:effectRef idx="0">
+            <a:schemeClr val="accent1"/>
+          </a:effectRef>
+          <a:fontRef idx="minor">
+            <a:schemeClr val="tx1"/>
+          </a:fontRef>
+        </p:style>
+      </p:cxnSp>
+      <p:sp>
+        <p:nvSpPr>
+          <p:cNvPr id="103" name="テキスト ボックス 102"/>
+          <p:cNvSpPr txBox="1"/>
+          <p:nvPr/>
+        </p:nvSpPr>
+        <p:spPr>
+          <a:xfrm>
+            <a:off x="9936782" y="7201142"/>
+            <a:ext cx="1008112" cy="253916"/>
+          </a:xfrm>
+          <a:prstGeom prst="rect">
+            <a:avLst/>
+          </a:prstGeom>
+          <a:noFill/>
+        </p:spPr>
+        <p:txBody>
+          <a:bodyPr wrap="square" rtlCol="0">
+            <a:spAutoFit/>
+          </a:bodyPr>
+          <a:lstStyle/>
+          <a:p>
+            <a:r>
+              <a:rPr kumimoji="1" lang="ja-JP" altLang="en-US" sz="1050" dirty="0" smtClean="0"/>
+              <a:t>直角カーブへ</a:t>
+            </a:r>
+            <a:endParaRPr kumimoji="1" lang="ja-JP" altLang="en-US" sz="1050" dirty="0"/>
+          </a:p>
+        </p:txBody>
+      </p:sp>
+      <p:sp>
+        <p:nvSpPr>
+          <p:cNvPr id="110" name="テキスト ボックス 109"/>
+          <p:cNvSpPr txBox="1"/>
+          <p:nvPr/>
+        </p:nvSpPr>
+        <p:spPr>
+          <a:xfrm>
+            <a:off x="7554416" y="4754950"/>
+            <a:ext cx="2183937" cy="1546577"/>
+          </a:xfrm>
+          <a:prstGeom prst="rect">
+            <a:avLst/>
+          </a:prstGeom>
+          <a:noFill/>
+        </p:spPr>
+        <p:txBody>
+          <a:bodyPr wrap="square" rtlCol="0">
+            <a:spAutoFit/>
+          </a:bodyPr>
+          <a:lstStyle/>
+          <a:p>
+            <a:r>
+              <a:rPr kumimoji="1" lang="ja-JP" altLang="en-US" sz="1050" dirty="0" smtClean="0"/>
+              <a:t>　左図のようにコースは細かく区間に分割された区間で構成されているとした。走行体は区間の切り替わりを検知し、最適なパラメータで走行する。難所エリアでは</a:t>
+            </a:r>
+            <a:r>
+              <a:rPr lang="ja-JP" altLang="en-US" sz="1050" dirty="0"/>
+              <a:t>左で区切った区間より</a:t>
+            </a:r>
+            <a:r>
+              <a:rPr lang="ja-JP" altLang="en-US" sz="1050" dirty="0" smtClean="0"/>
+              <a:t>も細かく区間が存在している。下図のように階段エリアでの区間分割である。それぞれの区間での動作は</a:t>
+            </a:r>
+            <a:r>
+              <a:rPr lang="en-US" altLang="ja-JP" sz="1050" dirty="0" smtClean="0"/>
+              <a:t>P4</a:t>
+            </a:r>
+            <a:r>
+              <a:rPr lang="ja-JP" altLang="en-US" sz="1050" dirty="0" smtClean="0"/>
+              <a:t>走行戦略参照。</a:t>
+            </a:r>
+            <a:endParaRPr kumimoji="1" lang="ja-JP" altLang="en-US" sz="1050" dirty="0"/>
+          </a:p>
+        </p:txBody>
+      </p:sp>
+      <p:sp>
+        <p:nvSpPr>
+          <p:cNvPr id="108" name="角丸四角形吹き出し 107"/>
+          <p:cNvSpPr/>
+          <p:nvPr/>
+        </p:nvSpPr>
+        <p:spPr>
+          <a:xfrm>
+            <a:off x="8720211" y="6301527"/>
+            <a:ext cx="2160240" cy="607737"/>
+          </a:xfrm>
+          <a:prstGeom prst="wedgeRoundRectCallout">
+            <a:avLst>
+              <a:gd name="adj1" fmla="val -28329"/>
+              <a:gd name="adj2" fmla="val 87707"/>
+              <a:gd name="adj3" fmla="val 16667"/>
+            </a:avLst>
+          </a:prstGeom>
+          <a:noFill/>
+        </p:spPr>
+        <p:style>
+          <a:lnRef idx="2">
+            <a:schemeClr val="accent1">
+              <a:shade val="50000"/>
+            </a:schemeClr>
+          </a:lnRef>
+          <a:fillRef idx="1">
+            <a:schemeClr val="accent1"/>
+          </a:fillRef>
+          <a:effectRef idx="0">
+            <a:schemeClr val="accent1"/>
+          </a:effectRef>
+          <a:fontRef idx="minor">
+            <a:schemeClr val="lt1"/>
+          </a:fontRef>
+        </p:style>
+        <p:txBody>
+          <a:bodyPr rtlCol="0" anchor="ctr"/>
+          <a:lstStyle/>
+          <a:p>
+            <a:r>
+              <a:rPr lang="ja-JP" altLang="en-US" sz="1100" dirty="0">
+                <a:solidFill>
+                  <a:schemeClr val="tx1"/>
+                </a:solidFill>
+              </a:rPr>
+              <a:t>破線で区切った区間それぞれに対応したパラメータと</a:t>
+            </a:r>
+            <a:r>
+              <a:rPr lang="ja-JP" altLang="en-US" sz="1050" dirty="0">
+                <a:solidFill>
+                  <a:schemeClr val="tx1"/>
+                </a:solidFill>
+              </a:rPr>
+              <a:t>区間切替</a:t>
+            </a:r>
+            <a:r>
+              <a:rPr lang="ja-JP" altLang="en-US" sz="1050" dirty="0"/>
+              <a:t>条件がある</a:t>
+            </a:r>
+            <a:endParaRPr lang="ja-JP" altLang="en-US" sz="1050" dirty="0"/>
+          </a:p>
+        </p:txBody>
+      </p:sp>
     </p:spTree>
     <p:extLst>
       <p:ext uri="{BB962C8B-B14F-4D97-AF65-F5344CB8AC3E}">

</xml_diff>